<commit_message>
Remove duplicate exercises document, replace copyrighted images
</commit_message>
<xml_diff>
--- a/units/4/lessons/3/resources/petascale-lesson-4.3-slides.pptx
+++ b/units/4/lessons/3/resources/petascale-lesson-4.3-slides.pptx
@@ -217,7 +217,7 @@
           <a:p>
             <a:fld id="{C40B3AFE-7C7C-4FC9-A8B9-F4DBDC42F3ED}" type="datetimeFigureOut">
               <a:rPr lang="en-US" smtClean="0"/>
-              <a:t>10/11/20</a:t>
+              <a:t>11/20/20</a:t>
             </a:fld>
             <a:endParaRPr lang="en-US"/>
           </a:p>
@@ -667,7 +667,7 @@
           <a:p>
             <a:fld id="{9ECC21AE-C854-42EF-90E6-1016E4386352}" type="datetimeFigureOut">
               <a:rPr lang="en-US" smtClean="0"/>
-              <a:t>10/11/20</a:t>
+              <a:t>11/20/20</a:t>
             </a:fld>
             <a:endParaRPr lang="en-US" dirty="0"/>
           </a:p>
@@ -941,7 +941,7 @@
           <a:p>
             <a:fld id="{9ECC21AE-C854-42EF-90E6-1016E4386352}" type="datetimeFigureOut">
               <a:rPr lang="en-US" smtClean="0"/>
-              <a:t>10/11/20</a:t>
+              <a:t>11/20/20</a:t>
             </a:fld>
             <a:endParaRPr lang="en-US" dirty="0"/>
           </a:p>
@@ -1135,7 +1135,7 @@
           <a:p>
             <a:fld id="{9ECC21AE-C854-42EF-90E6-1016E4386352}" type="datetimeFigureOut">
               <a:rPr lang="en-US" smtClean="0"/>
-              <a:t>10/11/20</a:t>
+              <a:t>11/20/20</a:t>
             </a:fld>
             <a:endParaRPr lang="en-US" dirty="0"/>
           </a:p>
@@ -1403,7 +1403,7 @@
           <a:p>
             <a:fld id="{9ECC21AE-C854-42EF-90E6-1016E4386352}" type="datetimeFigureOut">
               <a:rPr lang="en-US" smtClean="0"/>
-              <a:t>10/11/20</a:t>
+              <a:t>11/20/20</a:t>
             </a:fld>
             <a:endParaRPr lang="en-US" dirty="0"/>
           </a:p>
@@ -1735,7 +1735,7 @@
           <a:p>
             <a:fld id="{9ECC21AE-C854-42EF-90E6-1016E4386352}" type="datetimeFigureOut">
               <a:rPr lang="en-US" smtClean="0"/>
-              <a:t>10/11/20</a:t>
+              <a:t>11/20/20</a:t>
             </a:fld>
             <a:endParaRPr lang="en-US" dirty="0"/>
           </a:p>
@@ -2345,7 +2345,7 @@
           <a:p>
             <a:fld id="{9ECC21AE-C854-42EF-90E6-1016E4386352}" type="datetimeFigureOut">
               <a:rPr lang="en-US" smtClean="0"/>
-              <a:t>10/11/20</a:t>
+              <a:t>11/20/20</a:t>
             </a:fld>
             <a:endParaRPr lang="en-US" dirty="0"/>
           </a:p>
@@ -3189,7 +3189,7 @@
           <a:p>
             <a:fld id="{9ECC21AE-C854-42EF-90E6-1016E4386352}" type="datetimeFigureOut">
               <a:rPr lang="en-US" smtClean="0"/>
-              <a:t>10/11/20</a:t>
+              <a:t>11/20/20</a:t>
             </a:fld>
             <a:endParaRPr lang="en-US" dirty="0"/>
           </a:p>
@@ -3359,7 +3359,7 @@
           <a:p>
             <a:fld id="{9ECC21AE-C854-42EF-90E6-1016E4386352}" type="datetimeFigureOut">
               <a:rPr lang="en-US" smtClean="0"/>
-              <a:t>10/11/20</a:t>
+              <a:t>11/20/20</a:t>
             </a:fld>
             <a:endParaRPr lang="en-US" dirty="0"/>
           </a:p>
@@ -3539,7 +3539,7 @@
           <a:p>
             <a:fld id="{9ECC21AE-C854-42EF-90E6-1016E4386352}" type="datetimeFigureOut">
               <a:rPr lang="en-US" smtClean="0"/>
-              <a:t>10/11/20</a:t>
+              <a:t>11/20/20</a:t>
             </a:fld>
             <a:endParaRPr lang="en-US" dirty="0"/>
           </a:p>
@@ -4331,7 +4331,7 @@
           <a:p>
             <a:fld id="{9ECC21AE-C854-42EF-90E6-1016E4386352}" type="datetimeFigureOut">
               <a:rPr lang="en-US" smtClean="0"/>
-              <a:t>10/11/20</a:t>
+              <a:t>11/20/20</a:t>
             </a:fld>
             <a:endParaRPr lang="en-US" dirty="0"/>
           </a:p>
@@ -7435,7 +7435,7 @@
           <a:p>
             <a:fld id="{9ECC21AE-C854-42EF-90E6-1016E4386352}" type="datetimeFigureOut">
               <a:rPr lang="en-US" smtClean="0"/>
-              <a:t>10/11/20</a:t>
+              <a:t>11/20/20</a:t>
             </a:fld>
             <a:endParaRPr lang="en-US" dirty="0"/>
           </a:p>
@@ -7727,7 +7727,7 @@
           <a:p>
             <a:fld id="{9ECC21AE-C854-42EF-90E6-1016E4386352}" type="datetimeFigureOut">
               <a:rPr lang="en-US" smtClean="0"/>
-              <a:t>10/11/20</a:t>
+              <a:t>11/20/20</a:t>
             </a:fld>
             <a:endParaRPr lang="en-US" dirty="0"/>
           </a:p>
@@ -8165,7 +8165,7 @@
           <a:p>
             <a:fld id="{9ECC21AE-C854-42EF-90E6-1016E4386352}" type="datetimeFigureOut">
               <a:rPr lang="en-US" smtClean="0"/>
-              <a:t>10/11/20</a:t>
+              <a:t>11/20/20</a:t>
             </a:fld>
             <a:endParaRPr lang="en-US" dirty="0"/>
           </a:p>
@@ -8283,7 +8283,7 @@
           <a:p>
             <a:fld id="{9ECC21AE-C854-42EF-90E6-1016E4386352}" type="datetimeFigureOut">
               <a:rPr lang="en-US" smtClean="0"/>
-              <a:t>10/11/20</a:t>
+              <a:t>11/20/20</a:t>
             </a:fld>
             <a:endParaRPr lang="en-US" dirty="0"/>
           </a:p>
@@ -8378,7 +8378,7 @@
           <a:p>
             <a:fld id="{9ECC21AE-C854-42EF-90E6-1016E4386352}" type="datetimeFigureOut">
               <a:rPr lang="en-US" smtClean="0"/>
-              <a:t>10/11/20</a:t>
+              <a:t>11/20/20</a:t>
             </a:fld>
             <a:endParaRPr lang="en-US" dirty="0"/>
           </a:p>
@@ -8657,7 +8657,7 @@
           <a:p>
             <a:fld id="{9ECC21AE-C854-42EF-90E6-1016E4386352}" type="datetimeFigureOut">
               <a:rPr lang="en-US" smtClean="0"/>
-              <a:t>10/11/20</a:t>
+              <a:t>11/20/20</a:t>
             </a:fld>
             <a:endParaRPr lang="en-US" dirty="0"/>
           </a:p>
@@ -8931,7 +8931,7 @@
           <a:p>
             <a:fld id="{9ECC21AE-C854-42EF-90E6-1016E4386352}" type="datetimeFigureOut">
               <a:rPr lang="en-US" smtClean="0"/>
-              <a:t>10/11/20</a:t>
+              <a:t>11/20/20</a:t>
             </a:fld>
             <a:endParaRPr lang="en-US" dirty="0"/>
           </a:p>
@@ -9360,7 +9360,7 @@
           <a:p>
             <a:fld id="{9ECC21AE-C854-42EF-90E6-1016E4386352}" type="datetimeFigureOut">
               <a:rPr lang="en-US" smtClean="0"/>
-              <a:t>10/11/20</a:t>
+              <a:t>11/20/20</a:t>
             </a:fld>
             <a:endParaRPr lang="en-US" dirty="0"/>
           </a:p>
@@ -11357,10 +11357,10 @@
           <p:cNvPr id="8" name="Rectangle 7">
             <a:extLst>
               <a:ext uri="{FF2B5EF4-FFF2-40B4-BE49-F238E27FC236}">
-                <a16:creationId xmlns="" xmlns:a16="http://schemas.microsoft.com/office/drawing/2014/main" id="{74CD14DB-BB81-479F-A1FC-1C75640E9F84}"/>
+                <a16:creationId xmlns:a16="http://schemas.microsoft.com/office/drawing/2014/main" xmlns="" id="{74CD14DB-BB81-479F-A1FC-1C75640E9F84}"/>
               </a:ext>
               <a:ext uri="{C183D7F6-B498-43B3-948B-1728B52AA6E4}">
-                <adec:decorative xmlns="" xmlns:adec="http://schemas.microsoft.com/office/drawing/2017/decorative" val="1"/>
+                <adec:decorative xmlns:adec="http://schemas.microsoft.com/office/drawing/2017/decorative" xmlns="" val="1"/>
               </a:ext>
             </a:extLst>
           </p:cNvPr>
@@ -11446,10 +11446,10 @@
           <p:cNvPr id="10" name="Rectangle 9">
             <a:extLst>
               <a:ext uri="{FF2B5EF4-FFF2-40B4-BE49-F238E27FC236}">
-                <a16:creationId xmlns="" xmlns:a16="http://schemas.microsoft.com/office/drawing/2014/main" id="{C943A91B-7CA7-4592-A975-73B1BF8C4C74}"/>
+                <a16:creationId xmlns:a16="http://schemas.microsoft.com/office/drawing/2014/main" xmlns="" id="{C943A91B-7CA7-4592-A975-73B1BF8C4C74}"/>
               </a:ext>
               <a:ext uri="{C183D7F6-B498-43B3-948B-1728B52AA6E4}">
-                <adec:decorative xmlns="" xmlns:adec="http://schemas.microsoft.com/office/drawing/2017/decorative" val="1"/>
+                <adec:decorative xmlns:adec="http://schemas.microsoft.com/office/drawing/2017/decorative" xmlns="" val="1"/>
               </a:ext>
             </a:extLst>
           </p:cNvPr>
@@ -11499,10 +11499,10 @@
           <p:cNvPr id="12" name="Freeform 7">
             <a:extLst>
               <a:ext uri="{FF2B5EF4-FFF2-40B4-BE49-F238E27FC236}">
-                <a16:creationId xmlns="" xmlns:a16="http://schemas.microsoft.com/office/drawing/2014/main" id="{EC471314-E46A-414B-8D91-74880E84F187}"/>
+                <a16:creationId xmlns:a16="http://schemas.microsoft.com/office/drawing/2014/main" xmlns="" id="{EC471314-E46A-414B-8D91-74880E84F187}"/>
               </a:ext>
               <a:ext uri="{C183D7F6-B498-43B3-948B-1728B52AA6E4}">
-                <adec:decorative xmlns="" xmlns:adec="http://schemas.microsoft.com/office/drawing/2017/decorative" val="1"/>
+                <adec:decorative xmlns:adec="http://schemas.microsoft.com/office/drawing/2017/decorative" xmlns="" val="1"/>
               </a:ext>
             </a:extLst>
           </p:cNvPr>
@@ -11888,10 +11888,10 @@
           <p:cNvPr id="14" name="Freeform: Shape 13">
             <a:extLst>
               <a:ext uri="{FF2B5EF4-FFF2-40B4-BE49-F238E27FC236}">
-                <a16:creationId xmlns="" xmlns:a16="http://schemas.microsoft.com/office/drawing/2014/main" id="{6A681326-1C9D-44A3-A627-3871BDAE4127}"/>
+                <a16:creationId xmlns:a16="http://schemas.microsoft.com/office/drawing/2014/main" xmlns="" id="{6A681326-1C9D-44A3-A627-3871BDAE4127}"/>
               </a:ext>
               <a:ext uri="{C183D7F6-B498-43B3-948B-1728B52AA6E4}">
-                <adec:decorative xmlns="" xmlns:adec="http://schemas.microsoft.com/office/drawing/2017/decorative" val="1"/>
+                <adec:decorative xmlns:adec="http://schemas.microsoft.com/office/drawing/2017/decorative" xmlns="" val="1"/>
               </a:ext>
             </a:extLst>
           </p:cNvPr>
@@ -12351,7 +12351,7 @@
           <p:cNvPr id="2" name="Title 1">
             <a:extLst>
               <a:ext uri="{FF2B5EF4-FFF2-40B4-BE49-F238E27FC236}">
-                <a16:creationId xmlns="" xmlns:a16="http://schemas.microsoft.com/office/drawing/2014/main" id="{5343FD55-52BA-49ED-8622-99BA403F87BD}"/>
+                <a16:creationId xmlns:a16="http://schemas.microsoft.com/office/drawing/2014/main" xmlns="" id="{5343FD55-52BA-49ED-8622-99BA403F87BD}"/>
               </a:ext>
             </a:extLst>
           </p:cNvPr>
@@ -12390,7 +12390,7 @@
           <p:cNvPr id="3" name="Content Placeholder 2">
             <a:extLst>
               <a:ext uri="{FF2B5EF4-FFF2-40B4-BE49-F238E27FC236}">
-                <a16:creationId xmlns="" xmlns:a16="http://schemas.microsoft.com/office/drawing/2014/main" id="{03D921A0-DB4F-49E7-B69F-84CE55C2AD6E}"/>
+                <a16:creationId xmlns:a16="http://schemas.microsoft.com/office/drawing/2014/main" xmlns="" id="{03D921A0-DB4F-49E7-B69F-84CE55C2AD6E}"/>
               </a:ext>
             </a:extLst>
           </p:cNvPr>
@@ -12461,7 +12461,7 @@
           <p:cNvPr id="4" name="Picture 3">
             <a:extLst>
               <a:ext uri="{FF2B5EF4-FFF2-40B4-BE49-F238E27FC236}">
-                <a16:creationId xmlns="" xmlns:a16="http://schemas.microsoft.com/office/drawing/2014/main" id="{DA8E01D5-5E78-4C11-9244-BF9A303DB72F}"/>
+                <a16:creationId xmlns:a16="http://schemas.microsoft.com/office/drawing/2014/main" xmlns="" id="{DA8E01D5-5E78-4C11-9244-BF9A303DB72F}"/>
               </a:ext>
             </a:extLst>
           </p:cNvPr>
@@ -12529,10 +12529,10 @@
           <p:cNvPr id="8" name="Rectangle 7">
             <a:extLst>
               <a:ext uri="{FF2B5EF4-FFF2-40B4-BE49-F238E27FC236}">
-                <a16:creationId xmlns="" xmlns:a16="http://schemas.microsoft.com/office/drawing/2014/main" id="{74CD14DB-BB81-479F-A1FC-1C75640E9F84}"/>
+                <a16:creationId xmlns:a16="http://schemas.microsoft.com/office/drawing/2014/main" xmlns="" id="{74CD14DB-BB81-479F-A1FC-1C75640E9F84}"/>
               </a:ext>
               <a:ext uri="{C183D7F6-B498-43B3-948B-1728B52AA6E4}">
-                <adec:decorative xmlns="" xmlns:adec="http://schemas.microsoft.com/office/drawing/2017/decorative" val="1"/>
+                <adec:decorative xmlns:adec="http://schemas.microsoft.com/office/drawing/2017/decorative" xmlns="" val="1"/>
               </a:ext>
             </a:extLst>
           </p:cNvPr>
@@ -12618,10 +12618,10 @@
           <p:cNvPr id="10" name="Rectangle 9">
             <a:extLst>
               <a:ext uri="{FF2B5EF4-FFF2-40B4-BE49-F238E27FC236}">
-                <a16:creationId xmlns="" xmlns:a16="http://schemas.microsoft.com/office/drawing/2014/main" id="{C943A91B-7CA7-4592-A975-73B1BF8C4C74}"/>
+                <a16:creationId xmlns:a16="http://schemas.microsoft.com/office/drawing/2014/main" xmlns="" id="{C943A91B-7CA7-4592-A975-73B1BF8C4C74}"/>
               </a:ext>
               <a:ext uri="{C183D7F6-B498-43B3-948B-1728B52AA6E4}">
-                <adec:decorative xmlns="" xmlns:adec="http://schemas.microsoft.com/office/drawing/2017/decorative" val="1"/>
+                <adec:decorative xmlns:adec="http://schemas.microsoft.com/office/drawing/2017/decorative" xmlns="" val="1"/>
               </a:ext>
             </a:extLst>
           </p:cNvPr>
@@ -12671,10 +12671,10 @@
           <p:cNvPr id="12" name="Freeform 7">
             <a:extLst>
               <a:ext uri="{FF2B5EF4-FFF2-40B4-BE49-F238E27FC236}">
-                <a16:creationId xmlns="" xmlns:a16="http://schemas.microsoft.com/office/drawing/2014/main" id="{EC471314-E46A-414B-8D91-74880E84F187}"/>
+                <a16:creationId xmlns:a16="http://schemas.microsoft.com/office/drawing/2014/main" xmlns="" id="{EC471314-E46A-414B-8D91-74880E84F187}"/>
               </a:ext>
               <a:ext uri="{C183D7F6-B498-43B3-948B-1728B52AA6E4}">
-                <adec:decorative xmlns="" xmlns:adec="http://schemas.microsoft.com/office/drawing/2017/decorative" val="1"/>
+                <adec:decorative xmlns:adec="http://schemas.microsoft.com/office/drawing/2017/decorative" xmlns="" val="1"/>
               </a:ext>
             </a:extLst>
           </p:cNvPr>
@@ -13060,10 +13060,10 @@
           <p:cNvPr id="14" name="Freeform: Shape 13">
             <a:extLst>
               <a:ext uri="{FF2B5EF4-FFF2-40B4-BE49-F238E27FC236}">
-                <a16:creationId xmlns="" xmlns:a16="http://schemas.microsoft.com/office/drawing/2014/main" id="{6A681326-1C9D-44A3-A627-3871BDAE4127}"/>
+                <a16:creationId xmlns:a16="http://schemas.microsoft.com/office/drawing/2014/main" xmlns="" id="{6A681326-1C9D-44A3-A627-3871BDAE4127}"/>
               </a:ext>
               <a:ext uri="{C183D7F6-B498-43B3-948B-1728B52AA6E4}">
-                <adec:decorative xmlns="" xmlns:adec="http://schemas.microsoft.com/office/drawing/2017/decorative" val="1"/>
+                <adec:decorative xmlns:adec="http://schemas.microsoft.com/office/drawing/2017/decorative" xmlns="" val="1"/>
               </a:ext>
             </a:extLst>
           </p:cNvPr>
@@ -13523,7 +13523,7 @@
           <p:cNvPr id="2" name="Title 1">
             <a:extLst>
               <a:ext uri="{FF2B5EF4-FFF2-40B4-BE49-F238E27FC236}">
-                <a16:creationId xmlns="" xmlns:a16="http://schemas.microsoft.com/office/drawing/2014/main" id="{5343FD55-52BA-49ED-8622-99BA403F87BD}"/>
+                <a16:creationId xmlns:a16="http://schemas.microsoft.com/office/drawing/2014/main" xmlns="" id="{5343FD55-52BA-49ED-8622-99BA403F87BD}"/>
               </a:ext>
             </a:extLst>
           </p:cNvPr>
@@ -13562,7 +13562,7 @@
           <p:cNvPr id="3" name="Content Placeholder 2">
             <a:extLst>
               <a:ext uri="{FF2B5EF4-FFF2-40B4-BE49-F238E27FC236}">
-                <a16:creationId xmlns="" xmlns:a16="http://schemas.microsoft.com/office/drawing/2014/main" id="{03D921A0-DB4F-49E7-B69F-84CE55C2AD6E}"/>
+                <a16:creationId xmlns:a16="http://schemas.microsoft.com/office/drawing/2014/main" xmlns="" id="{03D921A0-DB4F-49E7-B69F-84CE55C2AD6E}"/>
               </a:ext>
             </a:extLst>
           </p:cNvPr>
@@ -13731,10 +13731,10 @@
           <p:cNvPr id="8" name="Rectangle 7">
             <a:extLst>
               <a:ext uri="{FF2B5EF4-FFF2-40B4-BE49-F238E27FC236}">
-                <a16:creationId xmlns="" xmlns:a16="http://schemas.microsoft.com/office/drawing/2014/main" id="{74CD14DB-BB81-479F-A1FC-1C75640E9F84}"/>
+                <a16:creationId xmlns:a16="http://schemas.microsoft.com/office/drawing/2014/main" xmlns="" id="{74CD14DB-BB81-479F-A1FC-1C75640E9F84}"/>
               </a:ext>
               <a:ext uri="{C183D7F6-B498-43B3-948B-1728B52AA6E4}">
-                <adec:decorative xmlns="" xmlns:adec="http://schemas.microsoft.com/office/drawing/2017/decorative" val="1"/>
+                <adec:decorative xmlns:adec="http://schemas.microsoft.com/office/drawing/2017/decorative" xmlns="" val="1"/>
               </a:ext>
             </a:extLst>
           </p:cNvPr>
@@ -13820,10 +13820,10 @@
           <p:cNvPr id="10" name="Rectangle 9">
             <a:extLst>
               <a:ext uri="{FF2B5EF4-FFF2-40B4-BE49-F238E27FC236}">
-                <a16:creationId xmlns="" xmlns:a16="http://schemas.microsoft.com/office/drawing/2014/main" id="{C943A91B-7CA7-4592-A975-73B1BF8C4C74}"/>
+                <a16:creationId xmlns:a16="http://schemas.microsoft.com/office/drawing/2014/main" xmlns="" id="{C943A91B-7CA7-4592-A975-73B1BF8C4C74}"/>
               </a:ext>
               <a:ext uri="{C183D7F6-B498-43B3-948B-1728B52AA6E4}">
-                <adec:decorative xmlns="" xmlns:adec="http://schemas.microsoft.com/office/drawing/2017/decorative" val="1"/>
+                <adec:decorative xmlns:adec="http://schemas.microsoft.com/office/drawing/2017/decorative" xmlns="" val="1"/>
               </a:ext>
             </a:extLst>
           </p:cNvPr>
@@ -13873,10 +13873,10 @@
           <p:cNvPr id="12" name="Freeform 7">
             <a:extLst>
               <a:ext uri="{FF2B5EF4-FFF2-40B4-BE49-F238E27FC236}">
-                <a16:creationId xmlns="" xmlns:a16="http://schemas.microsoft.com/office/drawing/2014/main" id="{EC471314-E46A-414B-8D91-74880E84F187}"/>
+                <a16:creationId xmlns:a16="http://schemas.microsoft.com/office/drawing/2014/main" xmlns="" id="{EC471314-E46A-414B-8D91-74880E84F187}"/>
               </a:ext>
               <a:ext uri="{C183D7F6-B498-43B3-948B-1728B52AA6E4}">
-                <adec:decorative xmlns="" xmlns:adec="http://schemas.microsoft.com/office/drawing/2017/decorative" val="1"/>
+                <adec:decorative xmlns:adec="http://schemas.microsoft.com/office/drawing/2017/decorative" xmlns="" val="1"/>
               </a:ext>
             </a:extLst>
           </p:cNvPr>
@@ -14262,10 +14262,10 @@
           <p:cNvPr id="14" name="Freeform: Shape 13">
             <a:extLst>
               <a:ext uri="{FF2B5EF4-FFF2-40B4-BE49-F238E27FC236}">
-                <a16:creationId xmlns="" xmlns:a16="http://schemas.microsoft.com/office/drawing/2014/main" id="{6A681326-1C9D-44A3-A627-3871BDAE4127}"/>
+                <a16:creationId xmlns:a16="http://schemas.microsoft.com/office/drawing/2014/main" xmlns="" id="{6A681326-1C9D-44A3-A627-3871BDAE4127}"/>
               </a:ext>
               <a:ext uri="{C183D7F6-B498-43B3-948B-1728B52AA6E4}">
-                <adec:decorative xmlns="" xmlns:adec="http://schemas.microsoft.com/office/drawing/2017/decorative" val="1"/>
+                <adec:decorative xmlns:adec="http://schemas.microsoft.com/office/drawing/2017/decorative" xmlns="" val="1"/>
               </a:ext>
             </a:extLst>
           </p:cNvPr>
@@ -14725,7 +14725,7 @@
           <p:cNvPr id="2" name="Title 1">
             <a:extLst>
               <a:ext uri="{FF2B5EF4-FFF2-40B4-BE49-F238E27FC236}">
-                <a16:creationId xmlns="" xmlns:a16="http://schemas.microsoft.com/office/drawing/2014/main" id="{5343FD55-52BA-49ED-8622-99BA403F87BD}"/>
+                <a16:creationId xmlns:a16="http://schemas.microsoft.com/office/drawing/2014/main" xmlns="" id="{5343FD55-52BA-49ED-8622-99BA403F87BD}"/>
               </a:ext>
             </a:extLst>
           </p:cNvPr>
@@ -14764,7 +14764,7 @@
           <p:cNvPr id="3" name="Content Placeholder 2">
             <a:extLst>
               <a:ext uri="{FF2B5EF4-FFF2-40B4-BE49-F238E27FC236}">
-                <a16:creationId xmlns="" xmlns:a16="http://schemas.microsoft.com/office/drawing/2014/main" id="{03D921A0-DB4F-49E7-B69F-84CE55C2AD6E}"/>
+                <a16:creationId xmlns:a16="http://schemas.microsoft.com/office/drawing/2014/main" xmlns="" id="{03D921A0-DB4F-49E7-B69F-84CE55C2AD6E}"/>
               </a:ext>
             </a:extLst>
           </p:cNvPr>
@@ -14990,10 +14990,10 @@
           <p:cNvPr id="8" name="Rectangle 7">
             <a:extLst>
               <a:ext uri="{FF2B5EF4-FFF2-40B4-BE49-F238E27FC236}">
-                <a16:creationId xmlns="" xmlns:a16="http://schemas.microsoft.com/office/drawing/2014/main" id="{74CD14DB-BB81-479F-A1FC-1C75640E9F84}"/>
+                <a16:creationId xmlns:a16="http://schemas.microsoft.com/office/drawing/2014/main" xmlns="" id="{74CD14DB-BB81-479F-A1FC-1C75640E9F84}"/>
               </a:ext>
               <a:ext uri="{C183D7F6-B498-43B3-948B-1728B52AA6E4}">
-                <adec:decorative xmlns="" xmlns:adec="http://schemas.microsoft.com/office/drawing/2017/decorative" val="1"/>
+                <adec:decorative xmlns:adec="http://schemas.microsoft.com/office/drawing/2017/decorative" xmlns="" val="1"/>
               </a:ext>
             </a:extLst>
           </p:cNvPr>
@@ -15079,10 +15079,10 @@
           <p:cNvPr id="10" name="Rectangle 9">
             <a:extLst>
               <a:ext uri="{FF2B5EF4-FFF2-40B4-BE49-F238E27FC236}">
-                <a16:creationId xmlns="" xmlns:a16="http://schemas.microsoft.com/office/drawing/2014/main" id="{C943A91B-7CA7-4592-A975-73B1BF8C4C74}"/>
+                <a16:creationId xmlns:a16="http://schemas.microsoft.com/office/drawing/2014/main" xmlns="" id="{C943A91B-7CA7-4592-A975-73B1BF8C4C74}"/>
               </a:ext>
               <a:ext uri="{C183D7F6-B498-43B3-948B-1728B52AA6E4}">
-                <adec:decorative xmlns="" xmlns:adec="http://schemas.microsoft.com/office/drawing/2017/decorative" val="1"/>
+                <adec:decorative xmlns:adec="http://schemas.microsoft.com/office/drawing/2017/decorative" xmlns="" val="1"/>
               </a:ext>
             </a:extLst>
           </p:cNvPr>
@@ -15132,10 +15132,10 @@
           <p:cNvPr id="12" name="Freeform 7">
             <a:extLst>
               <a:ext uri="{FF2B5EF4-FFF2-40B4-BE49-F238E27FC236}">
-                <a16:creationId xmlns="" xmlns:a16="http://schemas.microsoft.com/office/drawing/2014/main" id="{EC471314-E46A-414B-8D91-74880E84F187}"/>
+                <a16:creationId xmlns:a16="http://schemas.microsoft.com/office/drawing/2014/main" xmlns="" id="{EC471314-E46A-414B-8D91-74880E84F187}"/>
               </a:ext>
               <a:ext uri="{C183D7F6-B498-43B3-948B-1728B52AA6E4}">
-                <adec:decorative xmlns="" xmlns:adec="http://schemas.microsoft.com/office/drawing/2017/decorative" val="1"/>
+                <adec:decorative xmlns:adec="http://schemas.microsoft.com/office/drawing/2017/decorative" xmlns="" val="1"/>
               </a:ext>
             </a:extLst>
           </p:cNvPr>
@@ -15521,10 +15521,10 @@
           <p:cNvPr id="14" name="Freeform: Shape 13">
             <a:extLst>
               <a:ext uri="{FF2B5EF4-FFF2-40B4-BE49-F238E27FC236}">
-                <a16:creationId xmlns="" xmlns:a16="http://schemas.microsoft.com/office/drawing/2014/main" id="{6A681326-1C9D-44A3-A627-3871BDAE4127}"/>
+                <a16:creationId xmlns:a16="http://schemas.microsoft.com/office/drawing/2014/main" xmlns="" id="{6A681326-1C9D-44A3-A627-3871BDAE4127}"/>
               </a:ext>
               <a:ext uri="{C183D7F6-B498-43B3-948B-1728B52AA6E4}">
-                <adec:decorative xmlns="" xmlns:adec="http://schemas.microsoft.com/office/drawing/2017/decorative" val="1"/>
+                <adec:decorative xmlns:adec="http://schemas.microsoft.com/office/drawing/2017/decorative" xmlns="" val="1"/>
               </a:ext>
             </a:extLst>
           </p:cNvPr>
@@ -15984,7 +15984,7 @@
           <p:cNvPr id="2" name="Title 1">
             <a:extLst>
               <a:ext uri="{FF2B5EF4-FFF2-40B4-BE49-F238E27FC236}">
-                <a16:creationId xmlns="" xmlns:a16="http://schemas.microsoft.com/office/drawing/2014/main" id="{5343FD55-52BA-49ED-8622-99BA403F87BD}"/>
+                <a16:creationId xmlns:a16="http://schemas.microsoft.com/office/drawing/2014/main" xmlns="" id="{5343FD55-52BA-49ED-8622-99BA403F87BD}"/>
               </a:ext>
             </a:extLst>
           </p:cNvPr>
@@ -16023,7 +16023,7 @@
           <p:cNvPr id="3" name="Content Placeholder 2">
             <a:extLst>
               <a:ext uri="{FF2B5EF4-FFF2-40B4-BE49-F238E27FC236}">
-                <a16:creationId xmlns="" xmlns:a16="http://schemas.microsoft.com/office/drawing/2014/main" id="{03D921A0-DB4F-49E7-B69F-84CE55C2AD6E}"/>
+                <a16:creationId xmlns:a16="http://schemas.microsoft.com/office/drawing/2014/main" xmlns="" id="{03D921A0-DB4F-49E7-B69F-84CE55C2AD6E}"/>
               </a:ext>
             </a:extLst>
           </p:cNvPr>
@@ -16181,10 +16181,10 @@
           <p:cNvPr id="8" name="Rectangle 7">
             <a:extLst>
               <a:ext uri="{FF2B5EF4-FFF2-40B4-BE49-F238E27FC236}">
-                <a16:creationId xmlns="" xmlns:a16="http://schemas.microsoft.com/office/drawing/2014/main" id="{74CD14DB-BB81-479F-A1FC-1C75640E9F84}"/>
+                <a16:creationId xmlns:a16="http://schemas.microsoft.com/office/drawing/2014/main" xmlns="" id="{74CD14DB-BB81-479F-A1FC-1C75640E9F84}"/>
               </a:ext>
               <a:ext uri="{C183D7F6-B498-43B3-948B-1728B52AA6E4}">
-                <adec:decorative xmlns="" xmlns:adec="http://schemas.microsoft.com/office/drawing/2017/decorative" val="1"/>
+                <adec:decorative xmlns:adec="http://schemas.microsoft.com/office/drawing/2017/decorative" xmlns="" val="1"/>
               </a:ext>
             </a:extLst>
           </p:cNvPr>
@@ -16270,10 +16270,10 @@
           <p:cNvPr id="10" name="Rectangle 9">
             <a:extLst>
               <a:ext uri="{FF2B5EF4-FFF2-40B4-BE49-F238E27FC236}">
-                <a16:creationId xmlns="" xmlns:a16="http://schemas.microsoft.com/office/drawing/2014/main" id="{C943A91B-7CA7-4592-A975-73B1BF8C4C74}"/>
+                <a16:creationId xmlns:a16="http://schemas.microsoft.com/office/drawing/2014/main" xmlns="" id="{C943A91B-7CA7-4592-A975-73B1BF8C4C74}"/>
               </a:ext>
               <a:ext uri="{C183D7F6-B498-43B3-948B-1728B52AA6E4}">
-                <adec:decorative xmlns="" xmlns:adec="http://schemas.microsoft.com/office/drawing/2017/decorative" val="1"/>
+                <adec:decorative xmlns:adec="http://schemas.microsoft.com/office/drawing/2017/decorative" xmlns="" val="1"/>
               </a:ext>
             </a:extLst>
           </p:cNvPr>
@@ -16323,10 +16323,10 @@
           <p:cNvPr id="12" name="Freeform 7">
             <a:extLst>
               <a:ext uri="{FF2B5EF4-FFF2-40B4-BE49-F238E27FC236}">
-                <a16:creationId xmlns="" xmlns:a16="http://schemas.microsoft.com/office/drawing/2014/main" id="{EC471314-E46A-414B-8D91-74880E84F187}"/>
+                <a16:creationId xmlns:a16="http://schemas.microsoft.com/office/drawing/2014/main" xmlns="" id="{EC471314-E46A-414B-8D91-74880E84F187}"/>
               </a:ext>
               <a:ext uri="{C183D7F6-B498-43B3-948B-1728B52AA6E4}">
-                <adec:decorative xmlns="" xmlns:adec="http://schemas.microsoft.com/office/drawing/2017/decorative" val="1"/>
+                <adec:decorative xmlns:adec="http://schemas.microsoft.com/office/drawing/2017/decorative" xmlns="" val="1"/>
               </a:ext>
             </a:extLst>
           </p:cNvPr>
@@ -16712,10 +16712,10 @@
           <p:cNvPr id="14" name="Freeform: Shape 13">
             <a:extLst>
               <a:ext uri="{FF2B5EF4-FFF2-40B4-BE49-F238E27FC236}">
-                <a16:creationId xmlns="" xmlns:a16="http://schemas.microsoft.com/office/drawing/2014/main" id="{6A681326-1C9D-44A3-A627-3871BDAE4127}"/>
+                <a16:creationId xmlns:a16="http://schemas.microsoft.com/office/drawing/2014/main" xmlns="" id="{6A681326-1C9D-44A3-A627-3871BDAE4127}"/>
               </a:ext>
               <a:ext uri="{C183D7F6-B498-43B3-948B-1728B52AA6E4}">
-                <adec:decorative xmlns="" xmlns:adec="http://schemas.microsoft.com/office/drawing/2017/decorative" val="1"/>
+                <adec:decorative xmlns:adec="http://schemas.microsoft.com/office/drawing/2017/decorative" xmlns="" val="1"/>
               </a:ext>
             </a:extLst>
           </p:cNvPr>
@@ -17175,7 +17175,7 @@
           <p:cNvPr id="2" name="Title 1">
             <a:extLst>
               <a:ext uri="{FF2B5EF4-FFF2-40B4-BE49-F238E27FC236}">
-                <a16:creationId xmlns="" xmlns:a16="http://schemas.microsoft.com/office/drawing/2014/main" id="{5343FD55-52BA-49ED-8622-99BA403F87BD}"/>
+                <a16:creationId xmlns:a16="http://schemas.microsoft.com/office/drawing/2014/main" xmlns="" id="{5343FD55-52BA-49ED-8622-99BA403F87BD}"/>
               </a:ext>
             </a:extLst>
           </p:cNvPr>
@@ -17214,7 +17214,7 @@
           <p:cNvPr id="3" name="Content Placeholder 2">
             <a:extLst>
               <a:ext uri="{FF2B5EF4-FFF2-40B4-BE49-F238E27FC236}">
-                <a16:creationId xmlns="" xmlns:a16="http://schemas.microsoft.com/office/drawing/2014/main" id="{03D921A0-DB4F-49E7-B69F-84CE55C2AD6E}"/>
+                <a16:creationId xmlns:a16="http://schemas.microsoft.com/office/drawing/2014/main" xmlns="" id="{03D921A0-DB4F-49E7-B69F-84CE55C2AD6E}"/>
               </a:ext>
             </a:extLst>
           </p:cNvPr>
@@ -17366,10 +17366,10 @@
           <p:cNvPr id="8" name="Rectangle 7">
             <a:extLst>
               <a:ext uri="{FF2B5EF4-FFF2-40B4-BE49-F238E27FC236}">
-                <a16:creationId xmlns="" xmlns:a16="http://schemas.microsoft.com/office/drawing/2014/main" id="{74CD14DB-BB81-479F-A1FC-1C75640E9F84}"/>
+                <a16:creationId xmlns:a16="http://schemas.microsoft.com/office/drawing/2014/main" xmlns="" id="{74CD14DB-BB81-479F-A1FC-1C75640E9F84}"/>
               </a:ext>
               <a:ext uri="{C183D7F6-B498-43B3-948B-1728B52AA6E4}">
-                <adec:decorative xmlns="" xmlns:adec="http://schemas.microsoft.com/office/drawing/2017/decorative" val="1"/>
+                <adec:decorative xmlns:adec="http://schemas.microsoft.com/office/drawing/2017/decorative" xmlns="" val="1"/>
               </a:ext>
             </a:extLst>
           </p:cNvPr>
@@ -17455,10 +17455,10 @@
           <p:cNvPr id="10" name="Rectangle 9">
             <a:extLst>
               <a:ext uri="{FF2B5EF4-FFF2-40B4-BE49-F238E27FC236}">
-                <a16:creationId xmlns="" xmlns:a16="http://schemas.microsoft.com/office/drawing/2014/main" id="{C943A91B-7CA7-4592-A975-73B1BF8C4C74}"/>
+                <a16:creationId xmlns:a16="http://schemas.microsoft.com/office/drawing/2014/main" xmlns="" id="{C943A91B-7CA7-4592-A975-73B1BF8C4C74}"/>
               </a:ext>
               <a:ext uri="{C183D7F6-B498-43B3-948B-1728B52AA6E4}">
-                <adec:decorative xmlns="" xmlns:adec="http://schemas.microsoft.com/office/drawing/2017/decorative" val="1"/>
+                <adec:decorative xmlns:adec="http://schemas.microsoft.com/office/drawing/2017/decorative" xmlns="" val="1"/>
               </a:ext>
             </a:extLst>
           </p:cNvPr>
@@ -17508,10 +17508,10 @@
           <p:cNvPr id="12" name="Freeform 7">
             <a:extLst>
               <a:ext uri="{FF2B5EF4-FFF2-40B4-BE49-F238E27FC236}">
-                <a16:creationId xmlns="" xmlns:a16="http://schemas.microsoft.com/office/drawing/2014/main" id="{EC471314-E46A-414B-8D91-74880E84F187}"/>
+                <a16:creationId xmlns:a16="http://schemas.microsoft.com/office/drawing/2014/main" xmlns="" id="{EC471314-E46A-414B-8D91-74880E84F187}"/>
               </a:ext>
               <a:ext uri="{C183D7F6-B498-43B3-948B-1728B52AA6E4}">
-                <adec:decorative xmlns="" xmlns:adec="http://schemas.microsoft.com/office/drawing/2017/decorative" val="1"/>
+                <adec:decorative xmlns:adec="http://schemas.microsoft.com/office/drawing/2017/decorative" xmlns="" val="1"/>
               </a:ext>
             </a:extLst>
           </p:cNvPr>
@@ -17897,10 +17897,10 @@
           <p:cNvPr id="14" name="Freeform: Shape 13">
             <a:extLst>
               <a:ext uri="{FF2B5EF4-FFF2-40B4-BE49-F238E27FC236}">
-                <a16:creationId xmlns="" xmlns:a16="http://schemas.microsoft.com/office/drawing/2014/main" id="{6A681326-1C9D-44A3-A627-3871BDAE4127}"/>
+                <a16:creationId xmlns:a16="http://schemas.microsoft.com/office/drawing/2014/main" xmlns="" id="{6A681326-1C9D-44A3-A627-3871BDAE4127}"/>
               </a:ext>
               <a:ext uri="{C183D7F6-B498-43B3-948B-1728B52AA6E4}">
-                <adec:decorative xmlns="" xmlns:adec="http://schemas.microsoft.com/office/drawing/2017/decorative" val="1"/>
+                <adec:decorative xmlns:adec="http://schemas.microsoft.com/office/drawing/2017/decorative" xmlns="" val="1"/>
               </a:ext>
             </a:extLst>
           </p:cNvPr>
@@ -18360,7 +18360,7 @@
           <p:cNvPr id="2" name="Title 1">
             <a:extLst>
               <a:ext uri="{FF2B5EF4-FFF2-40B4-BE49-F238E27FC236}">
-                <a16:creationId xmlns="" xmlns:a16="http://schemas.microsoft.com/office/drawing/2014/main" id="{5343FD55-52BA-49ED-8622-99BA403F87BD}"/>
+                <a16:creationId xmlns:a16="http://schemas.microsoft.com/office/drawing/2014/main" xmlns="" id="{5343FD55-52BA-49ED-8622-99BA403F87BD}"/>
               </a:ext>
             </a:extLst>
           </p:cNvPr>
@@ -18399,7 +18399,7 @@
           <p:cNvPr id="3" name="Content Placeholder 2">
             <a:extLst>
               <a:ext uri="{FF2B5EF4-FFF2-40B4-BE49-F238E27FC236}">
-                <a16:creationId xmlns="" xmlns:a16="http://schemas.microsoft.com/office/drawing/2014/main" id="{03D921A0-DB4F-49E7-B69F-84CE55C2AD6E}"/>
+                <a16:creationId xmlns:a16="http://schemas.microsoft.com/office/drawing/2014/main" xmlns="" id="{03D921A0-DB4F-49E7-B69F-84CE55C2AD6E}"/>
               </a:ext>
             </a:extLst>
           </p:cNvPr>
@@ -18547,10 +18547,10 @@
           <p:cNvPr id="8" name="Rectangle 7">
             <a:extLst>
               <a:ext uri="{FF2B5EF4-FFF2-40B4-BE49-F238E27FC236}">
-                <a16:creationId xmlns="" xmlns:a16="http://schemas.microsoft.com/office/drawing/2014/main" id="{74CD14DB-BB81-479F-A1FC-1C75640E9F84}"/>
+                <a16:creationId xmlns:a16="http://schemas.microsoft.com/office/drawing/2014/main" xmlns="" id="{74CD14DB-BB81-479F-A1FC-1C75640E9F84}"/>
               </a:ext>
               <a:ext uri="{C183D7F6-B498-43B3-948B-1728B52AA6E4}">
-                <adec:decorative xmlns="" xmlns:adec="http://schemas.microsoft.com/office/drawing/2017/decorative" val="1"/>
+                <adec:decorative xmlns:adec="http://schemas.microsoft.com/office/drawing/2017/decorative" xmlns="" val="1"/>
               </a:ext>
             </a:extLst>
           </p:cNvPr>
@@ -18636,10 +18636,10 @@
           <p:cNvPr id="10" name="Rectangle 9">
             <a:extLst>
               <a:ext uri="{FF2B5EF4-FFF2-40B4-BE49-F238E27FC236}">
-                <a16:creationId xmlns="" xmlns:a16="http://schemas.microsoft.com/office/drawing/2014/main" id="{C943A91B-7CA7-4592-A975-73B1BF8C4C74}"/>
+                <a16:creationId xmlns:a16="http://schemas.microsoft.com/office/drawing/2014/main" xmlns="" id="{C943A91B-7CA7-4592-A975-73B1BF8C4C74}"/>
               </a:ext>
               <a:ext uri="{C183D7F6-B498-43B3-948B-1728B52AA6E4}">
-                <adec:decorative xmlns="" xmlns:adec="http://schemas.microsoft.com/office/drawing/2017/decorative" val="1"/>
+                <adec:decorative xmlns:adec="http://schemas.microsoft.com/office/drawing/2017/decorative" xmlns="" val="1"/>
               </a:ext>
             </a:extLst>
           </p:cNvPr>
@@ -18689,10 +18689,10 @@
           <p:cNvPr id="12" name="Freeform 7">
             <a:extLst>
               <a:ext uri="{FF2B5EF4-FFF2-40B4-BE49-F238E27FC236}">
-                <a16:creationId xmlns="" xmlns:a16="http://schemas.microsoft.com/office/drawing/2014/main" id="{EC471314-E46A-414B-8D91-74880E84F187}"/>
+                <a16:creationId xmlns:a16="http://schemas.microsoft.com/office/drawing/2014/main" xmlns="" id="{EC471314-E46A-414B-8D91-74880E84F187}"/>
               </a:ext>
               <a:ext uri="{C183D7F6-B498-43B3-948B-1728B52AA6E4}">
-                <adec:decorative xmlns="" xmlns:adec="http://schemas.microsoft.com/office/drawing/2017/decorative" val="1"/>
+                <adec:decorative xmlns:adec="http://schemas.microsoft.com/office/drawing/2017/decorative" xmlns="" val="1"/>
               </a:ext>
             </a:extLst>
           </p:cNvPr>
@@ -19078,10 +19078,10 @@
           <p:cNvPr id="14" name="Freeform: Shape 13">
             <a:extLst>
               <a:ext uri="{FF2B5EF4-FFF2-40B4-BE49-F238E27FC236}">
-                <a16:creationId xmlns="" xmlns:a16="http://schemas.microsoft.com/office/drawing/2014/main" id="{6A681326-1C9D-44A3-A627-3871BDAE4127}"/>
+                <a16:creationId xmlns:a16="http://schemas.microsoft.com/office/drawing/2014/main" xmlns="" id="{6A681326-1C9D-44A3-A627-3871BDAE4127}"/>
               </a:ext>
               <a:ext uri="{C183D7F6-B498-43B3-948B-1728B52AA6E4}">
-                <adec:decorative xmlns="" xmlns:adec="http://schemas.microsoft.com/office/drawing/2017/decorative" val="1"/>
+                <adec:decorative xmlns:adec="http://schemas.microsoft.com/office/drawing/2017/decorative" xmlns="" val="1"/>
               </a:ext>
             </a:extLst>
           </p:cNvPr>
@@ -19541,7 +19541,7 @@
           <p:cNvPr id="2" name="Title 1">
             <a:extLst>
               <a:ext uri="{FF2B5EF4-FFF2-40B4-BE49-F238E27FC236}">
-                <a16:creationId xmlns="" xmlns:a16="http://schemas.microsoft.com/office/drawing/2014/main" id="{5343FD55-52BA-49ED-8622-99BA403F87BD}"/>
+                <a16:creationId xmlns:a16="http://schemas.microsoft.com/office/drawing/2014/main" xmlns="" id="{5343FD55-52BA-49ED-8622-99BA403F87BD}"/>
               </a:ext>
             </a:extLst>
           </p:cNvPr>
@@ -19580,7 +19580,7 @@
           <p:cNvPr id="3" name="Content Placeholder 2">
             <a:extLst>
               <a:ext uri="{FF2B5EF4-FFF2-40B4-BE49-F238E27FC236}">
-                <a16:creationId xmlns="" xmlns:a16="http://schemas.microsoft.com/office/drawing/2014/main" id="{03D921A0-DB4F-49E7-B69F-84CE55C2AD6E}"/>
+                <a16:creationId xmlns:a16="http://schemas.microsoft.com/office/drawing/2014/main" xmlns="" id="{03D921A0-DB4F-49E7-B69F-84CE55C2AD6E}"/>
               </a:ext>
             </a:extLst>
           </p:cNvPr>
@@ -19747,10 +19747,10 @@
           <p:cNvPr id="8" name="Rectangle 7">
             <a:extLst>
               <a:ext uri="{FF2B5EF4-FFF2-40B4-BE49-F238E27FC236}">
-                <a16:creationId xmlns="" xmlns:a16="http://schemas.microsoft.com/office/drawing/2014/main" id="{74CD14DB-BB81-479F-A1FC-1C75640E9F84}"/>
+                <a16:creationId xmlns:a16="http://schemas.microsoft.com/office/drawing/2014/main" xmlns="" id="{74CD14DB-BB81-479F-A1FC-1C75640E9F84}"/>
               </a:ext>
               <a:ext uri="{C183D7F6-B498-43B3-948B-1728B52AA6E4}">
-                <adec:decorative xmlns="" xmlns:adec="http://schemas.microsoft.com/office/drawing/2017/decorative" val="1"/>
+                <adec:decorative xmlns:adec="http://schemas.microsoft.com/office/drawing/2017/decorative" xmlns="" val="1"/>
               </a:ext>
             </a:extLst>
           </p:cNvPr>
@@ -19836,10 +19836,10 @@
           <p:cNvPr id="10" name="Rectangle 9">
             <a:extLst>
               <a:ext uri="{FF2B5EF4-FFF2-40B4-BE49-F238E27FC236}">
-                <a16:creationId xmlns="" xmlns:a16="http://schemas.microsoft.com/office/drawing/2014/main" id="{C943A91B-7CA7-4592-A975-73B1BF8C4C74}"/>
+                <a16:creationId xmlns:a16="http://schemas.microsoft.com/office/drawing/2014/main" xmlns="" id="{C943A91B-7CA7-4592-A975-73B1BF8C4C74}"/>
               </a:ext>
               <a:ext uri="{C183D7F6-B498-43B3-948B-1728B52AA6E4}">
-                <adec:decorative xmlns="" xmlns:adec="http://schemas.microsoft.com/office/drawing/2017/decorative" val="1"/>
+                <adec:decorative xmlns:adec="http://schemas.microsoft.com/office/drawing/2017/decorative" xmlns="" val="1"/>
               </a:ext>
             </a:extLst>
           </p:cNvPr>
@@ -19889,10 +19889,10 @@
           <p:cNvPr id="12" name="Freeform 7">
             <a:extLst>
               <a:ext uri="{FF2B5EF4-FFF2-40B4-BE49-F238E27FC236}">
-                <a16:creationId xmlns="" xmlns:a16="http://schemas.microsoft.com/office/drawing/2014/main" id="{EC471314-E46A-414B-8D91-74880E84F187}"/>
+                <a16:creationId xmlns:a16="http://schemas.microsoft.com/office/drawing/2014/main" xmlns="" id="{EC471314-E46A-414B-8D91-74880E84F187}"/>
               </a:ext>
               <a:ext uri="{C183D7F6-B498-43B3-948B-1728B52AA6E4}">
-                <adec:decorative xmlns="" xmlns:adec="http://schemas.microsoft.com/office/drawing/2017/decorative" val="1"/>
+                <adec:decorative xmlns:adec="http://schemas.microsoft.com/office/drawing/2017/decorative" xmlns="" val="1"/>
               </a:ext>
             </a:extLst>
           </p:cNvPr>
@@ -20278,10 +20278,10 @@
           <p:cNvPr id="14" name="Freeform: Shape 13">
             <a:extLst>
               <a:ext uri="{FF2B5EF4-FFF2-40B4-BE49-F238E27FC236}">
-                <a16:creationId xmlns="" xmlns:a16="http://schemas.microsoft.com/office/drawing/2014/main" id="{6A681326-1C9D-44A3-A627-3871BDAE4127}"/>
+                <a16:creationId xmlns:a16="http://schemas.microsoft.com/office/drawing/2014/main" xmlns="" id="{6A681326-1C9D-44A3-A627-3871BDAE4127}"/>
               </a:ext>
               <a:ext uri="{C183D7F6-B498-43B3-948B-1728B52AA6E4}">
-                <adec:decorative xmlns="" xmlns:adec="http://schemas.microsoft.com/office/drawing/2017/decorative" val="1"/>
+                <adec:decorative xmlns:adec="http://schemas.microsoft.com/office/drawing/2017/decorative" xmlns="" val="1"/>
               </a:ext>
             </a:extLst>
           </p:cNvPr>
@@ -20741,7 +20741,7 @@
           <p:cNvPr id="2" name="Title 1">
             <a:extLst>
               <a:ext uri="{FF2B5EF4-FFF2-40B4-BE49-F238E27FC236}">
-                <a16:creationId xmlns="" xmlns:a16="http://schemas.microsoft.com/office/drawing/2014/main" id="{5343FD55-52BA-49ED-8622-99BA403F87BD}"/>
+                <a16:creationId xmlns:a16="http://schemas.microsoft.com/office/drawing/2014/main" xmlns="" id="{5343FD55-52BA-49ED-8622-99BA403F87BD}"/>
               </a:ext>
             </a:extLst>
           </p:cNvPr>
@@ -20780,7 +20780,7 @@
           <p:cNvPr id="3" name="Content Placeholder 2">
             <a:extLst>
               <a:ext uri="{FF2B5EF4-FFF2-40B4-BE49-F238E27FC236}">
-                <a16:creationId xmlns="" xmlns:a16="http://schemas.microsoft.com/office/drawing/2014/main" id="{03D921A0-DB4F-49E7-B69F-84CE55C2AD6E}"/>
+                <a16:creationId xmlns:a16="http://schemas.microsoft.com/office/drawing/2014/main" xmlns="" id="{03D921A0-DB4F-49E7-B69F-84CE55C2AD6E}"/>
               </a:ext>
             </a:extLst>
           </p:cNvPr>
@@ -20923,10 +20923,10 @@
           <p:cNvPr id="8" name="Rectangle 7">
             <a:extLst>
               <a:ext uri="{FF2B5EF4-FFF2-40B4-BE49-F238E27FC236}">
-                <a16:creationId xmlns="" xmlns:a16="http://schemas.microsoft.com/office/drawing/2014/main" id="{74CD14DB-BB81-479F-A1FC-1C75640E9F84}"/>
+                <a16:creationId xmlns:a16="http://schemas.microsoft.com/office/drawing/2014/main" xmlns="" id="{74CD14DB-BB81-479F-A1FC-1C75640E9F84}"/>
               </a:ext>
               <a:ext uri="{C183D7F6-B498-43B3-948B-1728B52AA6E4}">
-                <adec:decorative xmlns="" xmlns:adec="http://schemas.microsoft.com/office/drawing/2017/decorative" val="1"/>
+                <adec:decorative xmlns:adec="http://schemas.microsoft.com/office/drawing/2017/decorative" xmlns="" val="1"/>
               </a:ext>
             </a:extLst>
           </p:cNvPr>
@@ -21012,10 +21012,10 @@
           <p:cNvPr id="10" name="Rectangle 9">
             <a:extLst>
               <a:ext uri="{FF2B5EF4-FFF2-40B4-BE49-F238E27FC236}">
-                <a16:creationId xmlns="" xmlns:a16="http://schemas.microsoft.com/office/drawing/2014/main" id="{C943A91B-7CA7-4592-A975-73B1BF8C4C74}"/>
+                <a16:creationId xmlns:a16="http://schemas.microsoft.com/office/drawing/2014/main" xmlns="" id="{C943A91B-7CA7-4592-A975-73B1BF8C4C74}"/>
               </a:ext>
               <a:ext uri="{C183D7F6-B498-43B3-948B-1728B52AA6E4}">
-                <adec:decorative xmlns="" xmlns:adec="http://schemas.microsoft.com/office/drawing/2017/decorative" val="1"/>
+                <adec:decorative xmlns:adec="http://schemas.microsoft.com/office/drawing/2017/decorative" xmlns="" val="1"/>
               </a:ext>
             </a:extLst>
           </p:cNvPr>
@@ -21065,10 +21065,10 @@
           <p:cNvPr id="12" name="Freeform 7">
             <a:extLst>
               <a:ext uri="{FF2B5EF4-FFF2-40B4-BE49-F238E27FC236}">
-                <a16:creationId xmlns="" xmlns:a16="http://schemas.microsoft.com/office/drawing/2014/main" id="{EC471314-E46A-414B-8D91-74880E84F187}"/>
+                <a16:creationId xmlns:a16="http://schemas.microsoft.com/office/drawing/2014/main" xmlns="" id="{EC471314-E46A-414B-8D91-74880E84F187}"/>
               </a:ext>
               <a:ext uri="{C183D7F6-B498-43B3-948B-1728B52AA6E4}">
-                <adec:decorative xmlns="" xmlns:adec="http://schemas.microsoft.com/office/drawing/2017/decorative" val="1"/>
+                <adec:decorative xmlns:adec="http://schemas.microsoft.com/office/drawing/2017/decorative" xmlns="" val="1"/>
               </a:ext>
             </a:extLst>
           </p:cNvPr>
@@ -21454,10 +21454,10 @@
           <p:cNvPr id="14" name="Freeform: Shape 13">
             <a:extLst>
               <a:ext uri="{FF2B5EF4-FFF2-40B4-BE49-F238E27FC236}">
-                <a16:creationId xmlns="" xmlns:a16="http://schemas.microsoft.com/office/drawing/2014/main" id="{6A681326-1C9D-44A3-A627-3871BDAE4127}"/>
+                <a16:creationId xmlns:a16="http://schemas.microsoft.com/office/drawing/2014/main" xmlns="" id="{6A681326-1C9D-44A3-A627-3871BDAE4127}"/>
               </a:ext>
               <a:ext uri="{C183D7F6-B498-43B3-948B-1728B52AA6E4}">
-                <adec:decorative xmlns="" xmlns:adec="http://schemas.microsoft.com/office/drawing/2017/decorative" val="1"/>
+                <adec:decorative xmlns:adec="http://schemas.microsoft.com/office/drawing/2017/decorative" xmlns="" val="1"/>
               </a:ext>
             </a:extLst>
           </p:cNvPr>
@@ -21917,7 +21917,7 @@
           <p:cNvPr id="2" name="Title 1">
             <a:extLst>
               <a:ext uri="{FF2B5EF4-FFF2-40B4-BE49-F238E27FC236}">
-                <a16:creationId xmlns="" xmlns:a16="http://schemas.microsoft.com/office/drawing/2014/main" id="{5343FD55-52BA-49ED-8622-99BA403F87BD}"/>
+                <a16:creationId xmlns:a16="http://schemas.microsoft.com/office/drawing/2014/main" xmlns="" id="{5343FD55-52BA-49ED-8622-99BA403F87BD}"/>
               </a:ext>
             </a:extLst>
           </p:cNvPr>
@@ -21956,7 +21956,7 @@
           <p:cNvPr id="3" name="Content Placeholder 2">
             <a:extLst>
               <a:ext uri="{FF2B5EF4-FFF2-40B4-BE49-F238E27FC236}">
-                <a16:creationId xmlns="" xmlns:a16="http://schemas.microsoft.com/office/drawing/2014/main" id="{03D921A0-DB4F-49E7-B69F-84CE55C2AD6E}"/>
+                <a16:creationId xmlns:a16="http://schemas.microsoft.com/office/drawing/2014/main" xmlns="" id="{03D921A0-DB4F-49E7-B69F-84CE55C2AD6E}"/>
               </a:ext>
             </a:extLst>
           </p:cNvPr>
@@ -22216,10 +22216,10 @@
           <p:cNvPr id="8" name="Rectangle 7">
             <a:extLst>
               <a:ext uri="{FF2B5EF4-FFF2-40B4-BE49-F238E27FC236}">
-                <a16:creationId xmlns="" xmlns:a16="http://schemas.microsoft.com/office/drawing/2014/main" id="{74CD14DB-BB81-479F-A1FC-1C75640E9F84}"/>
+                <a16:creationId xmlns:a16="http://schemas.microsoft.com/office/drawing/2014/main" xmlns="" id="{74CD14DB-BB81-479F-A1FC-1C75640E9F84}"/>
               </a:ext>
               <a:ext uri="{C183D7F6-B498-43B3-948B-1728B52AA6E4}">
-                <adec:decorative xmlns="" xmlns:adec="http://schemas.microsoft.com/office/drawing/2017/decorative" val="1"/>
+                <adec:decorative xmlns:adec="http://schemas.microsoft.com/office/drawing/2017/decorative" xmlns="" val="1"/>
               </a:ext>
             </a:extLst>
           </p:cNvPr>
@@ -22305,10 +22305,10 @@
           <p:cNvPr id="10" name="Rectangle 9">
             <a:extLst>
               <a:ext uri="{FF2B5EF4-FFF2-40B4-BE49-F238E27FC236}">
-                <a16:creationId xmlns="" xmlns:a16="http://schemas.microsoft.com/office/drawing/2014/main" id="{C943A91B-7CA7-4592-A975-73B1BF8C4C74}"/>
+                <a16:creationId xmlns:a16="http://schemas.microsoft.com/office/drawing/2014/main" xmlns="" id="{C943A91B-7CA7-4592-A975-73B1BF8C4C74}"/>
               </a:ext>
               <a:ext uri="{C183D7F6-B498-43B3-948B-1728B52AA6E4}">
-                <adec:decorative xmlns="" xmlns:adec="http://schemas.microsoft.com/office/drawing/2017/decorative" val="1"/>
+                <adec:decorative xmlns:adec="http://schemas.microsoft.com/office/drawing/2017/decorative" xmlns="" val="1"/>
               </a:ext>
             </a:extLst>
           </p:cNvPr>
@@ -22358,10 +22358,10 @@
           <p:cNvPr id="12" name="Freeform 7">
             <a:extLst>
               <a:ext uri="{FF2B5EF4-FFF2-40B4-BE49-F238E27FC236}">
-                <a16:creationId xmlns="" xmlns:a16="http://schemas.microsoft.com/office/drawing/2014/main" id="{EC471314-E46A-414B-8D91-74880E84F187}"/>
+                <a16:creationId xmlns:a16="http://schemas.microsoft.com/office/drawing/2014/main" xmlns="" id="{EC471314-E46A-414B-8D91-74880E84F187}"/>
               </a:ext>
               <a:ext uri="{C183D7F6-B498-43B3-948B-1728B52AA6E4}">
-                <adec:decorative xmlns="" xmlns:adec="http://schemas.microsoft.com/office/drawing/2017/decorative" val="1"/>
+                <adec:decorative xmlns:adec="http://schemas.microsoft.com/office/drawing/2017/decorative" xmlns="" val="1"/>
               </a:ext>
             </a:extLst>
           </p:cNvPr>
@@ -22747,10 +22747,10 @@
           <p:cNvPr id="14" name="Freeform: Shape 13">
             <a:extLst>
               <a:ext uri="{FF2B5EF4-FFF2-40B4-BE49-F238E27FC236}">
-                <a16:creationId xmlns="" xmlns:a16="http://schemas.microsoft.com/office/drawing/2014/main" id="{6A681326-1C9D-44A3-A627-3871BDAE4127}"/>
+                <a16:creationId xmlns:a16="http://schemas.microsoft.com/office/drawing/2014/main" xmlns="" id="{6A681326-1C9D-44A3-A627-3871BDAE4127}"/>
               </a:ext>
               <a:ext uri="{C183D7F6-B498-43B3-948B-1728B52AA6E4}">
-                <adec:decorative xmlns="" xmlns:adec="http://schemas.microsoft.com/office/drawing/2017/decorative" val="1"/>
+                <adec:decorative xmlns:adec="http://schemas.microsoft.com/office/drawing/2017/decorative" xmlns="" val="1"/>
               </a:ext>
             </a:extLst>
           </p:cNvPr>
@@ -23210,7 +23210,7 @@
           <p:cNvPr id="2" name="Title 1">
             <a:extLst>
               <a:ext uri="{FF2B5EF4-FFF2-40B4-BE49-F238E27FC236}">
-                <a16:creationId xmlns="" xmlns:a16="http://schemas.microsoft.com/office/drawing/2014/main" id="{5343FD55-52BA-49ED-8622-99BA403F87BD}"/>
+                <a16:creationId xmlns:a16="http://schemas.microsoft.com/office/drawing/2014/main" xmlns="" id="{5343FD55-52BA-49ED-8622-99BA403F87BD}"/>
               </a:ext>
             </a:extLst>
           </p:cNvPr>
@@ -23254,7 +23254,7 @@
           <p:cNvPr id="3" name="Content Placeholder 2">
             <a:extLst>
               <a:ext uri="{FF2B5EF4-FFF2-40B4-BE49-F238E27FC236}">
-                <a16:creationId xmlns="" xmlns:a16="http://schemas.microsoft.com/office/drawing/2014/main" id="{03D921A0-DB4F-49E7-B69F-84CE55C2AD6E}"/>
+                <a16:creationId xmlns:a16="http://schemas.microsoft.com/office/drawing/2014/main" xmlns="" id="{03D921A0-DB4F-49E7-B69F-84CE55C2AD6E}"/>
               </a:ext>
             </a:extLst>
           </p:cNvPr>
@@ -23298,7 +23298,7 @@
                 <a:hlinkClick r:id="rId2">
                   <a:extLst>
                     <a:ext uri="{A12FA001-AC4F-418D-AE19-62706E023703}">
-                      <ahyp:hlinkClr xmlns="" xmlns:ahyp="http://schemas.microsoft.com/office/drawing/2018/hyperlinkcolor" val="tx"/>
+                      <ahyp:hlinkClr xmlns:ahyp="http://schemas.microsoft.com/office/drawing/2018/hyperlinkcolor" xmlns="" val="tx"/>
                     </a:ext>
                   </a:extLst>
                 </a:hlinkClick>
@@ -23435,23 +23435,7 @@
                 <a:ea typeface="Times New Roman" charset="0"/>
                 <a:cs typeface="Times New Roman" charset="0"/>
               </a:rPr>
-              <a:t>CC </a:t>
-            </a:r>
-            <a:r>
-              <a:rPr lang="en-US" sz="2800" dirty="0">
-                <a:latin typeface="Times New Roman" charset="0"/>
-                <a:ea typeface="Times New Roman" charset="0"/>
-                <a:cs typeface="Times New Roman" charset="0"/>
-              </a:rPr>
-              <a:t>BY-SA </a:t>
-            </a:r>
-            <a:r>
-              <a:rPr lang="en-US" sz="2800" dirty="0">
-                <a:latin typeface="Times New Roman" charset="0"/>
-                <a:ea typeface="Times New Roman" charset="0"/>
-                <a:cs typeface="Times New Roman" charset="0"/>
-              </a:rPr>
-              <a:t>4.0. To view a copy of this license, visit </a:t>
+              <a:t>CC BY-SA 4.0. To view a copy of this license, visit </a:t>
             </a:r>
             <a:r>
               <a:rPr lang="en-US" sz="2800" dirty="0">
@@ -23460,16 +23444,7 @@
                 <a:cs typeface="Times New Roman" charset="0"/>
                 <a:hlinkClick r:id="rId2"/>
               </a:rPr>
-              <a:t>https://</a:t>
-            </a:r>
-            <a:r>
-              <a:rPr lang="en-US" sz="2800" dirty="0">
-                <a:latin typeface="Times New Roman" charset="0"/>
-                <a:ea typeface="Times New Roman" charset="0"/>
-                <a:cs typeface="Times New Roman" charset="0"/>
-                <a:hlinkClick r:id="rId2"/>
-              </a:rPr>
-              <a:t>creativecommons.org/licenses/by-sa/4.0</a:t>
+              <a:t>https://creativecommons.org/licenses/by-sa/4.0</a:t>
             </a:r>
             <a:r>
               <a:rPr lang="en-US" sz="2800" dirty="0">
@@ -23663,10 +23638,10 @@
           <p:cNvPr id="8" name="Rectangle 7">
             <a:extLst>
               <a:ext uri="{FF2B5EF4-FFF2-40B4-BE49-F238E27FC236}">
-                <a16:creationId xmlns="" xmlns:a16="http://schemas.microsoft.com/office/drawing/2014/main" id="{74CD14DB-BB81-479F-A1FC-1C75640E9F84}"/>
+                <a16:creationId xmlns:a16="http://schemas.microsoft.com/office/drawing/2014/main" xmlns="" id="{74CD14DB-BB81-479F-A1FC-1C75640E9F84}"/>
               </a:ext>
               <a:ext uri="{C183D7F6-B498-43B3-948B-1728B52AA6E4}">
-                <adec:decorative xmlns="" xmlns:adec="http://schemas.microsoft.com/office/drawing/2017/decorative" val="1"/>
+                <adec:decorative xmlns:adec="http://schemas.microsoft.com/office/drawing/2017/decorative" xmlns="" val="1"/>
               </a:ext>
             </a:extLst>
           </p:cNvPr>
@@ -23752,10 +23727,10 @@
           <p:cNvPr id="10" name="Rectangle 9">
             <a:extLst>
               <a:ext uri="{FF2B5EF4-FFF2-40B4-BE49-F238E27FC236}">
-                <a16:creationId xmlns="" xmlns:a16="http://schemas.microsoft.com/office/drawing/2014/main" id="{C943A91B-7CA7-4592-A975-73B1BF8C4C74}"/>
+                <a16:creationId xmlns:a16="http://schemas.microsoft.com/office/drawing/2014/main" xmlns="" id="{C943A91B-7CA7-4592-A975-73B1BF8C4C74}"/>
               </a:ext>
               <a:ext uri="{C183D7F6-B498-43B3-948B-1728B52AA6E4}">
-                <adec:decorative xmlns="" xmlns:adec="http://schemas.microsoft.com/office/drawing/2017/decorative" val="1"/>
+                <adec:decorative xmlns:adec="http://schemas.microsoft.com/office/drawing/2017/decorative" xmlns="" val="1"/>
               </a:ext>
             </a:extLst>
           </p:cNvPr>
@@ -23805,10 +23780,10 @@
           <p:cNvPr id="12" name="Freeform 7">
             <a:extLst>
               <a:ext uri="{FF2B5EF4-FFF2-40B4-BE49-F238E27FC236}">
-                <a16:creationId xmlns="" xmlns:a16="http://schemas.microsoft.com/office/drawing/2014/main" id="{EC471314-E46A-414B-8D91-74880E84F187}"/>
+                <a16:creationId xmlns:a16="http://schemas.microsoft.com/office/drawing/2014/main" xmlns="" id="{EC471314-E46A-414B-8D91-74880E84F187}"/>
               </a:ext>
               <a:ext uri="{C183D7F6-B498-43B3-948B-1728B52AA6E4}">
-                <adec:decorative xmlns="" xmlns:adec="http://schemas.microsoft.com/office/drawing/2017/decorative" val="1"/>
+                <adec:decorative xmlns:adec="http://schemas.microsoft.com/office/drawing/2017/decorative" xmlns="" val="1"/>
               </a:ext>
             </a:extLst>
           </p:cNvPr>
@@ -24194,10 +24169,10 @@
           <p:cNvPr id="14" name="Freeform: Shape 13">
             <a:extLst>
               <a:ext uri="{FF2B5EF4-FFF2-40B4-BE49-F238E27FC236}">
-                <a16:creationId xmlns="" xmlns:a16="http://schemas.microsoft.com/office/drawing/2014/main" id="{6A681326-1C9D-44A3-A627-3871BDAE4127}"/>
+                <a16:creationId xmlns:a16="http://schemas.microsoft.com/office/drawing/2014/main" xmlns="" id="{6A681326-1C9D-44A3-A627-3871BDAE4127}"/>
               </a:ext>
               <a:ext uri="{C183D7F6-B498-43B3-948B-1728B52AA6E4}">
-                <adec:decorative xmlns="" xmlns:adec="http://schemas.microsoft.com/office/drawing/2017/decorative" val="1"/>
+                <adec:decorative xmlns:adec="http://schemas.microsoft.com/office/drawing/2017/decorative" xmlns="" val="1"/>
               </a:ext>
             </a:extLst>
           </p:cNvPr>
@@ -24657,7 +24632,7 @@
           <p:cNvPr id="2" name="Title 1">
             <a:extLst>
               <a:ext uri="{FF2B5EF4-FFF2-40B4-BE49-F238E27FC236}">
-                <a16:creationId xmlns="" xmlns:a16="http://schemas.microsoft.com/office/drawing/2014/main" id="{2711179C-96B1-4D42-B0BC-8CDF62250646}"/>
+                <a16:creationId xmlns:a16="http://schemas.microsoft.com/office/drawing/2014/main" xmlns="" id="{2711179C-96B1-4D42-B0BC-8CDF62250646}"/>
               </a:ext>
             </a:extLst>
           </p:cNvPr>
@@ -24754,10 +24729,10 @@
           <p:cNvPr id="8" name="Rectangle 7">
             <a:extLst>
               <a:ext uri="{FF2B5EF4-FFF2-40B4-BE49-F238E27FC236}">
-                <a16:creationId xmlns="" xmlns:a16="http://schemas.microsoft.com/office/drawing/2014/main" id="{DE27238C-8EAF-4098-86E6-7723B7DAE601}"/>
+                <a16:creationId xmlns:a16="http://schemas.microsoft.com/office/drawing/2014/main" xmlns="" id="{DE27238C-8EAF-4098-86E6-7723B7DAE601}"/>
               </a:ext>
               <a:ext uri="{C183D7F6-B498-43B3-948B-1728B52AA6E4}">
-                <adec:decorative xmlns="" xmlns:adec="http://schemas.microsoft.com/office/drawing/2017/decorative" val="1"/>
+                <adec:decorative xmlns:adec="http://schemas.microsoft.com/office/drawing/2017/decorative" xmlns="" val="1"/>
               </a:ext>
             </a:extLst>
           </p:cNvPr>
@@ -24817,10 +24792,10 @@
           <p:cNvPr id="10" name="Freeform 36">
             <a:extLst>
               <a:ext uri="{FF2B5EF4-FFF2-40B4-BE49-F238E27FC236}">
-                <a16:creationId xmlns="" xmlns:a16="http://schemas.microsoft.com/office/drawing/2014/main" id="{992F97B1-1891-4FCC-9E5F-BA97EDB48F89}"/>
+                <a16:creationId xmlns:a16="http://schemas.microsoft.com/office/drawing/2014/main" xmlns="" id="{992F97B1-1891-4FCC-9E5F-BA97EDB48F89}"/>
               </a:ext>
               <a:ext uri="{C183D7F6-B498-43B3-948B-1728B52AA6E4}">
-                <adec:decorative xmlns="" xmlns:adec="http://schemas.microsoft.com/office/drawing/2017/decorative" val="1"/>
+                <adec:decorative xmlns:adec="http://schemas.microsoft.com/office/drawing/2017/decorative" xmlns="" val="1"/>
               </a:ext>
             </a:extLst>
           </p:cNvPr>
@@ -25171,10 +25146,10 @@
           <p:cNvPr id="12" name="Freeform: Shape 11">
             <a:extLst>
               <a:ext uri="{FF2B5EF4-FFF2-40B4-BE49-F238E27FC236}">
-                <a16:creationId xmlns="" xmlns:a16="http://schemas.microsoft.com/office/drawing/2014/main" id="{78C6C821-FEE1-4EB6-9590-C021440C77DE}"/>
+                <a16:creationId xmlns:a16="http://schemas.microsoft.com/office/drawing/2014/main" xmlns="" id="{78C6C821-FEE1-4EB6-9590-C021440C77DE}"/>
               </a:ext>
               <a:ext uri="{C183D7F6-B498-43B3-948B-1728B52AA6E4}">
-                <adec:decorative xmlns="" xmlns:adec="http://schemas.microsoft.com/office/drawing/2017/decorative" val="1"/>
+                <adec:decorative xmlns:adec="http://schemas.microsoft.com/office/drawing/2017/decorative" xmlns="" val="1"/>
               </a:ext>
             </a:extLst>
           </p:cNvPr>
@@ -25715,7 +25690,7 @@
           <p:cNvPr id="2" name="Title 1">
             <a:extLst>
               <a:ext uri="{FF2B5EF4-FFF2-40B4-BE49-F238E27FC236}">
-                <a16:creationId xmlns="" xmlns:a16="http://schemas.microsoft.com/office/drawing/2014/main" id="{B4A50DC5-78F7-43A1-BB91-7DBF8F6AEF90}"/>
+                <a16:creationId xmlns:a16="http://schemas.microsoft.com/office/drawing/2014/main" xmlns="" id="{B4A50DC5-78F7-43A1-BB91-7DBF8F6AEF90}"/>
               </a:ext>
             </a:extLst>
           </p:cNvPr>
@@ -25755,10 +25730,10 @@
           <p:cNvPr id="14" name="Rectangle 13">
             <a:extLst>
               <a:ext uri="{FF2B5EF4-FFF2-40B4-BE49-F238E27FC236}">
-                <a16:creationId xmlns="" xmlns:a16="http://schemas.microsoft.com/office/drawing/2014/main" id="{B61A74B3-E247-44D4-8C48-FAE8E2056401}"/>
+                <a16:creationId xmlns:a16="http://schemas.microsoft.com/office/drawing/2014/main" xmlns="" id="{B61A74B3-E247-44D4-8C48-FAE8E2056401}"/>
               </a:ext>
               <a:ext uri="{C183D7F6-B498-43B3-948B-1728B52AA6E4}">
-                <adec:decorative xmlns="" xmlns:adec="http://schemas.microsoft.com/office/drawing/2017/decorative" val="1"/>
+                <adec:decorative xmlns:adec="http://schemas.microsoft.com/office/drawing/2017/decorative" xmlns="" val="1"/>
               </a:ext>
             </a:extLst>
           </p:cNvPr>
@@ -25846,10 +25821,10 @@
           <p:cNvPr id="8" name="Rectangle 7">
             <a:extLst>
               <a:ext uri="{FF2B5EF4-FFF2-40B4-BE49-F238E27FC236}">
-                <a16:creationId xmlns="" xmlns:a16="http://schemas.microsoft.com/office/drawing/2014/main" id="{74CD14DB-BB81-479F-A1FC-1C75640E9F84}"/>
+                <a16:creationId xmlns:a16="http://schemas.microsoft.com/office/drawing/2014/main" xmlns="" id="{74CD14DB-BB81-479F-A1FC-1C75640E9F84}"/>
               </a:ext>
               <a:ext uri="{C183D7F6-B498-43B3-948B-1728B52AA6E4}">
-                <adec:decorative xmlns="" xmlns:adec="http://schemas.microsoft.com/office/drawing/2017/decorative" val="1"/>
+                <adec:decorative xmlns:adec="http://schemas.microsoft.com/office/drawing/2017/decorative" xmlns="" val="1"/>
               </a:ext>
             </a:extLst>
           </p:cNvPr>
@@ -25935,10 +25910,10 @@
           <p:cNvPr id="10" name="Rectangle 9">
             <a:extLst>
               <a:ext uri="{FF2B5EF4-FFF2-40B4-BE49-F238E27FC236}">
-                <a16:creationId xmlns="" xmlns:a16="http://schemas.microsoft.com/office/drawing/2014/main" id="{C943A91B-7CA7-4592-A975-73B1BF8C4C74}"/>
+                <a16:creationId xmlns:a16="http://schemas.microsoft.com/office/drawing/2014/main" xmlns="" id="{C943A91B-7CA7-4592-A975-73B1BF8C4C74}"/>
               </a:ext>
               <a:ext uri="{C183D7F6-B498-43B3-948B-1728B52AA6E4}">
-                <adec:decorative xmlns="" xmlns:adec="http://schemas.microsoft.com/office/drawing/2017/decorative" val="1"/>
+                <adec:decorative xmlns:adec="http://schemas.microsoft.com/office/drawing/2017/decorative" xmlns="" val="1"/>
               </a:ext>
             </a:extLst>
           </p:cNvPr>
@@ -25988,10 +25963,10 @@
           <p:cNvPr id="12" name="Freeform 7">
             <a:extLst>
               <a:ext uri="{FF2B5EF4-FFF2-40B4-BE49-F238E27FC236}">
-                <a16:creationId xmlns="" xmlns:a16="http://schemas.microsoft.com/office/drawing/2014/main" id="{EC471314-E46A-414B-8D91-74880E84F187}"/>
+                <a16:creationId xmlns:a16="http://schemas.microsoft.com/office/drawing/2014/main" xmlns="" id="{EC471314-E46A-414B-8D91-74880E84F187}"/>
               </a:ext>
               <a:ext uri="{C183D7F6-B498-43B3-948B-1728B52AA6E4}">
-                <adec:decorative xmlns="" xmlns:adec="http://schemas.microsoft.com/office/drawing/2017/decorative" val="1"/>
+                <adec:decorative xmlns:adec="http://schemas.microsoft.com/office/drawing/2017/decorative" xmlns="" val="1"/>
               </a:ext>
             </a:extLst>
           </p:cNvPr>
@@ -26377,10 +26352,10 @@
           <p:cNvPr id="14" name="Freeform: Shape 13">
             <a:extLst>
               <a:ext uri="{FF2B5EF4-FFF2-40B4-BE49-F238E27FC236}">
-                <a16:creationId xmlns="" xmlns:a16="http://schemas.microsoft.com/office/drawing/2014/main" id="{6A681326-1C9D-44A3-A627-3871BDAE4127}"/>
+                <a16:creationId xmlns:a16="http://schemas.microsoft.com/office/drawing/2014/main" xmlns="" id="{6A681326-1C9D-44A3-A627-3871BDAE4127}"/>
               </a:ext>
               <a:ext uri="{C183D7F6-B498-43B3-948B-1728B52AA6E4}">
-                <adec:decorative xmlns="" xmlns:adec="http://schemas.microsoft.com/office/drawing/2017/decorative" val="1"/>
+                <adec:decorative xmlns:adec="http://schemas.microsoft.com/office/drawing/2017/decorative" xmlns="" val="1"/>
               </a:ext>
             </a:extLst>
           </p:cNvPr>
@@ -26840,7 +26815,7 @@
           <p:cNvPr id="2" name="Title 1">
             <a:extLst>
               <a:ext uri="{FF2B5EF4-FFF2-40B4-BE49-F238E27FC236}">
-                <a16:creationId xmlns="" xmlns:a16="http://schemas.microsoft.com/office/drawing/2014/main" id="{B7071FE9-1E09-4CD9-87A5-923A30F20AA2}"/>
+                <a16:creationId xmlns:a16="http://schemas.microsoft.com/office/drawing/2014/main" xmlns="" id="{B7071FE9-1E09-4CD9-87A5-923A30F20AA2}"/>
               </a:ext>
             </a:extLst>
           </p:cNvPr>
@@ -26879,7 +26854,7 @@
           <p:cNvPr id="3" name="Content Placeholder 2">
             <a:extLst>
               <a:ext uri="{FF2B5EF4-FFF2-40B4-BE49-F238E27FC236}">
-                <a16:creationId xmlns="" xmlns:a16="http://schemas.microsoft.com/office/drawing/2014/main" id="{5042D8AC-A055-42E8-AF39-7C9B30ED64D9}"/>
+                <a16:creationId xmlns:a16="http://schemas.microsoft.com/office/drawing/2014/main" xmlns="" id="{5042D8AC-A055-42E8-AF39-7C9B30ED64D9}"/>
               </a:ext>
             </a:extLst>
           </p:cNvPr>
@@ -27052,10 +27027,10 @@
           <p:cNvPr id="8" name="Rectangle 7">
             <a:extLst>
               <a:ext uri="{FF2B5EF4-FFF2-40B4-BE49-F238E27FC236}">
-                <a16:creationId xmlns="" xmlns:a16="http://schemas.microsoft.com/office/drawing/2014/main" id="{74CD14DB-BB81-479F-A1FC-1C75640E9F84}"/>
+                <a16:creationId xmlns:a16="http://schemas.microsoft.com/office/drawing/2014/main" xmlns="" id="{74CD14DB-BB81-479F-A1FC-1C75640E9F84}"/>
               </a:ext>
               <a:ext uri="{C183D7F6-B498-43B3-948B-1728B52AA6E4}">
-                <adec:decorative xmlns="" xmlns:adec="http://schemas.microsoft.com/office/drawing/2017/decorative" val="1"/>
+                <adec:decorative xmlns:adec="http://schemas.microsoft.com/office/drawing/2017/decorative" xmlns="" val="1"/>
               </a:ext>
             </a:extLst>
           </p:cNvPr>
@@ -27141,10 +27116,10 @@
           <p:cNvPr id="10" name="Rectangle 9">
             <a:extLst>
               <a:ext uri="{FF2B5EF4-FFF2-40B4-BE49-F238E27FC236}">
-                <a16:creationId xmlns="" xmlns:a16="http://schemas.microsoft.com/office/drawing/2014/main" id="{C943A91B-7CA7-4592-A975-73B1BF8C4C74}"/>
+                <a16:creationId xmlns:a16="http://schemas.microsoft.com/office/drawing/2014/main" xmlns="" id="{C943A91B-7CA7-4592-A975-73B1BF8C4C74}"/>
               </a:ext>
               <a:ext uri="{C183D7F6-B498-43B3-948B-1728B52AA6E4}">
-                <adec:decorative xmlns="" xmlns:adec="http://schemas.microsoft.com/office/drawing/2017/decorative" val="1"/>
+                <adec:decorative xmlns:adec="http://schemas.microsoft.com/office/drawing/2017/decorative" xmlns="" val="1"/>
               </a:ext>
             </a:extLst>
           </p:cNvPr>
@@ -27194,10 +27169,10 @@
           <p:cNvPr id="12" name="Freeform 7">
             <a:extLst>
               <a:ext uri="{FF2B5EF4-FFF2-40B4-BE49-F238E27FC236}">
-                <a16:creationId xmlns="" xmlns:a16="http://schemas.microsoft.com/office/drawing/2014/main" id="{EC471314-E46A-414B-8D91-74880E84F187}"/>
+                <a16:creationId xmlns:a16="http://schemas.microsoft.com/office/drawing/2014/main" xmlns="" id="{EC471314-E46A-414B-8D91-74880E84F187}"/>
               </a:ext>
               <a:ext uri="{C183D7F6-B498-43B3-948B-1728B52AA6E4}">
-                <adec:decorative xmlns="" xmlns:adec="http://schemas.microsoft.com/office/drawing/2017/decorative" val="1"/>
+                <adec:decorative xmlns:adec="http://schemas.microsoft.com/office/drawing/2017/decorative" xmlns="" val="1"/>
               </a:ext>
             </a:extLst>
           </p:cNvPr>
@@ -27583,10 +27558,10 @@
           <p:cNvPr id="14" name="Freeform: Shape 13">
             <a:extLst>
               <a:ext uri="{FF2B5EF4-FFF2-40B4-BE49-F238E27FC236}">
-                <a16:creationId xmlns="" xmlns:a16="http://schemas.microsoft.com/office/drawing/2014/main" id="{6A681326-1C9D-44A3-A627-3871BDAE4127}"/>
+                <a16:creationId xmlns:a16="http://schemas.microsoft.com/office/drawing/2014/main" xmlns="" id="{6A681326-1C9D-44A3-A627-3871BDAE4127}"/>
               </a:ext>
               <a:ext uri="{C183D7F6-B498-43B3-948B-1728B52AA6E4}">
-                <adec:decorative xmlns="" xmlns:adec="http://schemas.microsoft.com/office/drawing/2017/decorative" val="1"/>
+                <adec:decorative xmlns:adec="http://schemas.microsoft.com/office/drawing/2017/decorative" xmlns="" val="1"/>
               </a:ext>
             </a:extLst>
           </p:cNvPr>
@@ -28046,7 +28021,7 @@
           <p:cNvPr id="2" name="Title 1">
             <a:extLst>
               <a:ext uri="{FF2B5EF4-FFF2-40B4-BE49-F238E27FC236}">
-                <a16:creationId xmlns="" xmlns:a16="http://schemas.microsoft.com/office/drawing/2014/main" id="{B7071FE9-1E09-4CD9-87A5-923A30F20AA2}"/>
+                <a16:creationId xmlns:a16="http://schemas.microsoft.com/office/drawing/2014/main" xmlns="" id="{B7071FE9-1E09-4CD9-87A5-923A30F20AA2}"/>
               </a:ext>
             </a:extLst>
           </p:cNvPr>
@@ -28085,7 +28060,7 @@
           <p:cNvPr id="3" name="Content Placeholder 2">
             <a:extLst>
               <a:ext uri="{FF2B5EF4-FFF2-40B4-BE49-F238E27FC236}">
-                <a16:creationId xmlns="" xmlns:a16="http://schemas.microsoft.com/office/drawing/2014/main" id="{5042D8AC-A055-42E8-AF39-7C9B30ED64D9}"/>
+                <a16:creationId xmlns:a16="http://schemas.microsoft.com/office/drawing/2014/main" xmlns="" id="{5042D8AC-A055-42E8-AF39-7C9B30ED64D9}"/>
               </a:ext>
             </a:extLst>
           </p:cNvPr>
@@ -28179,7 +28154,7 @@
           <p:cNvPr id="4" name="Picture 3">
             <a:extLst>
               <a:ext uri="{FF2B5EF4-FFF2-40B4-BE49-F238E27FC236}">
-                <a16:creationId xmlns="" xmlns:a16="http://schemas.microsoft.com/office/drawing/2014/main" id="{3B0C537D-60DB-4A38-AC7F-6124BA49CE8F}"/>
+                <a16:creationId xmlns:a16="http://schemas.microsoft.com/office/drawing/2014/main" xmlns="" id="{3B0C537D-60DB-4A38-AC7F-6124BA49CE8F}"/>
               </a:ext>
             </a:extLst>
           </p:cNvPr>
@@ -28214,6 +28189,13 @@
   <p:clrMapOvr>
     <a:overrideClrMapping bg1="lt1" tx1="dk1" bg2="lt2" tx2="dk2" accent1="accent1" accent2="accent2" accent3="accent3" accent4="accent4" accent5="accent5" accent6="accent6" hlink="hlink" folHlink="folHlink"/>
   </p:clrMapOvr>
+  <p:timing>
+    <p:tnLst>
+      <p:par>
+        <p:cTn id="1" dur="indefinite" restart="never" nodeType="tmRoot"/>
+      </p:par>
+    </p:tnLst>
+  </p:timing>
 </p:sld>
 </file>
 
@@ -28242,15 +28224,39 @@
           <a:chExt cx="0" cy="0"/>
         </a:xfrm>
       </p:grpSpPr>
+      <p:pic>
+        <p:nvPicPr>
+          <p:cNvPr id="11" name="Picture 10"/>
+          <p:cNvPicPr>
+            <a:picLocks noChangeAspect="1"/>
+          </p:cNvPicPr>
+          <p:nvPr/>
+        </p:nvPicPr>
+        <p:blipFill>
+          <a:blip r:embed="rId2"/>
+          <a:stretch>
+            <a:fillRect/>
+          </a:stretch>
+        </p:blipFill>
+        <p:spPr>
+          <a:xfrm>
+            <a:off x="7504961" y="4324698"/>
+            <a:ext cx="4437897" cy="2118270"/>
+          </a:xfrm>
+          <a:prstGeom prst="rect">
+            <a:avLst/>
+          </a:prstGeom>
+        </p:spPr>
+      </p:pic>
       <p:sp>
         <p:nvSpPr>
           <p:cNvPr id="8" name="Rectangle 7">
             <a:extLst>
               <a:ext uri="{FF2B5EF4-FFF2-40B4-BE49-F238E27FC236}">
-                <a16:creationId xmlns="" xmlns:a16="http://schemas.microsoft.com/office/drawing/2014/main" id="{74CD14DB-BB81-479F-A1FC-1C75640E9F84}"/>
+                <a16:creationId xmlns:a16="http://schemas.microsoft.com/office/drawing/2014/main" xmlns="" id="{74CD14DB-BB81-479F-A1FC-1C75640E9F84}"/>
               </a:ext>
               <a:ext uri="{C183D7F6-B498-43B3-948B-1728B52AA6E4}">
-                <adec:decorative xmlns="" xmlns:adec="http://schemas.microsoft.com/office/drawing/2017/decorative" val="1"/>
+                <adec:decorative xmlns:adec="http://schemas.microsoft.com/office/drawing/2017/decorative" xmlns="" val="1"/>
               </a:ext>
             </a:extLst>
           </p:cNvPr>
@@ -28336,10 +28342,10 @@
           <p:cNvPr id="10" name="Rectangle 9">
             <a:extLst>
               <a:ext uri="{FF2B5EF4-FFF2-40B4-BE49-F238E27FC236}">
-                <a16:creationId xmlns="" xmlns:a16="http://schemas.microsoft.com/office/drawing/2014/main" id="{C943A91B-7CA7-4592-A975-73B1BF8C4C74}"/>
+                <a16:creationId xmlns:a16="http://schemas.microsoft.com/office/drawing/2014/main" xmlns="" id="{C943A91B-7CA7-4592-A975-73B1BF8C4C74}"/>
               </a:ext>
               <a:ext uri="{C183D7F6-B498-43B3-948B-1728B52AA6E4}">
-                <adec:decorative xmlns="" xmlns:adec="http://schemas.microsoft.com/office/drawing/2017/decorative" val="1"/>
+                <adec:decorative xmlns:adec="http://schemas.microsoft.com/office/drawing/2017/decorative" xmlns="" val="1"/>
               </a:ext>
             </a:extLst>
           </p:cNvPr>
@@ -28389,10 +28395,10 @@
           <p:cNvPr id="12" name="Freeform 7">
             <a:extLst>
               <a:ext uri="{FF2B5EF4-FFF2-40B4-BE49-F238E27FC236}">
-                <a16:creationId xmlns="" xmlns:a16="http://schemas.microsoft.com/office/drawing/2014/main" id="{EC471314-E46A-414B-8D91-74880E84F187}"/>
+                <a16:creationId xmlns:a16="http://schemas.microsoft.com/office/drawing/2014/main" xmlns="" id="{EC471314-E46A-414B-8D91-74880E84F187}"/>
               </a:ext>
               <a:ext uri="{C183D7F6-B498-43B3-948B-1728B52AA6E4}">
-                <adec:decorative xmlns="" xmlns:adec="http://schemas.microsoft.com/office/drawing/2017/decorative" val="1"/>
+                <adec:decorative xmlns:adec="http://schemas.microsoft.com/office/drawing/2017/decorative" xmlns="" val="1"/>
               </a:ext>
             </a:extLst>
           </p:cNvPr>
@@ -28778,10 +28784,10 @@
           <p:cNvPr id="14" name="Freeform: Shape 13">
             <a:extLst>
               <a:ext uri="{FF2B5EF4-FFF2-40B4-BE49-F238E27FC236}">
-                <a16:creationId xmlns="" xmlns:a16="http://schemas.microsoft.com/office/drawing/2014/main" id="{6A681326-1C9D-44A3-A627-3871BDAE4127}"/>
+                <a16:creationId xmlns:a16="http://schemas.microsoft.com/office/drawing/2014/main" xmlns="" id="{6A681326-1C9D-44A3-A627-3871BDAE4127}"/>
               </a:ext>
               <a:ext uri="{C183D7F6-B498-43B3-948B-1728B52AA6E4}">
-                <adec:decorative xmlns="" xmlns:adec="http://schemas.microsoft.com/office/drawing/2017/decorative" val="1"/>
+                <adec:decorative xmlns:adec="http://schemas.microsoft.com/office/drawing/2017/decorative" xmlns="" val="1"/>
               </a:ext>
             </a:extLst>
           </p:cNvPr>
@@ -29241,7 +29247,7 @@
           <p:cNvPr id="2" name="Title 1">
             <a:extLst>
               <a:ext uri="{FF2B5EF4-FFF2-40B4-BE49-F238E27FC236}">
-                <a16:creationId xmlns="" xmlns:a16="http://schemas.microsoft.com/office/drawing/2014/main" id="{B7071FE9-1E09-4CD9-87A5-923A30F20AA2}"/>
+                <a16:creationId xmlns:a16="http://schemas.microsoft.com/office/drawing/2014/main" xmlns="" id="{B7071FE9-1E09-4CD9-87A5-923A30F20AA2}"/>
               </a:ext>
             </a:extLst>
           </p:cNvPr>
@@ -29280,7 +29286,7 @@
           <p:cNvPr id="3" name="Content Placeholder 2">
             <a:extLst>
               <a:ext uri="{FF2B5EF4-FFF2-40B4-BE49-F238E27FC236}">
-                <a16:creationId xmlns="" xmlns:a16="http://schemas.microsoft.com/office/drawing/2014/main" id="{5042D8AC-A055-42E8-AF39-7C9B30ED64D9}"/>
+                <a16:creationId xmlns:a16="http://schemas.microsoft.com/office/drawing/2014/main" xmlns="" id="{5042D8AC-A055-42E8-AF39-7C9B30ED64D9}"/>
               </a:ext>
             </a:extLst>
           </p:cNvPr>
@@ -29343,130 +29349,12 @@
           </a:p>
         </p:txBody>
       </p:sp>
-      <p:pic>
-        <p:nvPicPr>
-          <p:cNvPr id="4" name="Picture 3">
-            <a:extLst>
-              <a:ext uri="{FF2B5EF4-FFF2-40B4-BE49-F238E27FC236}">
-                <a16:creationId xmlns="" xmlns:a16="http://schemas.microsoft.com/office/drawing/2014/main" id="{BF6C1C1D-90B7-4049-9DB4-0F65343218C1}"/>
-              </a:ext>
-            </a:extLst>
-          </p:cNvPr>
-          <p:cNvPicPr>
-            <a:picLocks noChangeAspect="1"/>
-          </p:cNvPicPr>
-          <p:nvPr/>
-        </p:nvPicPr>
-        <p:blipFill>
-          <a:blip r:embed="rId2">
-            <a:duotone>
-              <a:prstClr val="black"/>
-              <a:schemeClr val="accent1">
-                <a:tint val="45000"/>
-                <a:satMod val="400000"/>
-              </a:schemeClr>
-            </a:duotone>
-            <a:extLst>
-              <a:ext uri="{BEBA8EAE-BF5A-486C-A8C5-ECC9F3942E4B}">
-                <a14:imgProps xmlns:a14="http://schemas.microsoft.com/office/drawing/2010/main">
-                  <a14:imgLayer r:embed="rId3">
-                    <a14:imgEffect>
-                      <a14:sharpenSoften amount="50000"/>
-                    </a14:imgEffect>
-                  </a14:imgLayer>
-                </a14:imgProps>
-              </a:ext>
-            </a:extLst>
-          </a:blip>
-          <a:stretch>
-            <a:fillRect/>
-          </a:stretch>
-        </p:blipFill>
-        <p:spPr>
-          <a:xfrm>
-            <a:off x="1936049" y="4533662"/>
-            <a:ext cx="2881086" cy="2013087"/>
-          </a:xfrm>
-          <a:prstGeom prst="rect">
-            <a:avLst/>
-          </a:prstGeom>
-          <a:ln>
-            <a:noFill/>
-          </a:ln>
-          <a:effectLst>
-            <a:outerShdw blurRad="190500" algn="tl" rotWithShape="0">
-              <a:srgbClr val="000000">
-                <a:alpha val="70000"/>
-              </a:srgbClr>
-            </a:outerShdw>
-          </a:effectLst>
-        </p:spPr>
-      </p:pic>
-      <p:pic>
-        <p:nvPicPr>
-          <p:cNvPr id="5" name="Picture 4">
-            <a:extLst>
-              <a:ext uri="{FF2B5EF4-FFF2-40B4-BE49-F238E27FC236}">
-                <a16:creationId xmlns="" xmlns:a16="http://schemas.microsoft.com/office/drawing/2014/main" id="{1EFA7916-6B90-49AC-86DF-F67EEF809988}"/>
-              </a:ext>
-            </a:extLst>
-          </p:cNvPr>
-          <p:cNvPicPr>
-            <a:picLocks noChangeAspect="1"/>
-          </p:cNvPicPr>
-          <p:nvPr/>
-        </p:nvPicPr>
-        <p:blipFill>
-          <a:blip r:embed="rId4">
-            <a:duotone>
-              <a:prstClr val="black"/>
-              <a:schemeClr val="accent1">
-                <a:tint val="45000"/>
-                <a:satMod val="400000"/>
-              </a:schemeClr>
-            </a:duotone>
-            <a:extLst>
-              <a:ext uri="{BEBA8EAE-BF5A-486C-A8C5-ECC9F3942E4B}">
-                <a14:imgProps xmlns:a14="http://schemas.microsoft.com/office/drawing/2010/main">
-                  <a14:imgLayer r:embed="rId5">
-                    <a14:imgEffect>
-                      <a14:sharpenSoften amount="50000"/>
-                    </a14:imgEffect>
-                  </a14:imgLayer>
-                </a14:imgProps>
-              </a:ext>
-            </a:extLst>
-          </a:blip>
-          <a:stretch>
-            <a:fillRect/>
-          </a:stretch>
-        </p:blipFill>
-        <p:spPr>
-          <a:xfrm>
-            <a:off x="7991406" y="4734097"/>
-            <a:ext cx="3643656" cy="1688524"/>
-          </a:xfrm>
-          <a:prstGeom prst="rect">
-            <a:avLst/>
-          </a:prstGeom>
-          <a:ln>
-            <a:noFill/>
-          </a:ln>
-          <a:effectLst>
-            <a:outerShdw blurRad="190500" algn="tl" rotWithShape="0">
-              <a:srgbClr val="000000">
-                <a:alpha val="70000"/>
-              </a:srgbClr>
-            </a:outerShdw>
-          </a:effectLst>
-        </p:spPr>
-      </p:pic>
       <p:sp>
         <p:nvSpPr>
           <p:cNvPr id="6" name="Rectangle 5">
             <a:extLst>
               <a:ext uri="{FF2B5EF4-FFF2-40B4-BE49-F238E27FC236}">
-                <a16:creationId xmlns="" xmlns:a16="http://schemas.microsoft.com/office/drawing/2014/main" id="{C9DE435A-0D76-45CA-AB53-2E42E6702B15}"/>
+                <a16:creationId xmlns:a16="http://schemas.microsoft.com/office/drawing/2014/main" xmlns="" id="{C9DE435A-0D76-45CA-AB53-2E42E6702B15}"/>
               </a:ext>
             </a:extLst>
           </p:cNvPr>
@@ -29502,24 +29390,72 @@
               <a:t>): in this architecture many SMPs are linked together, however all processors </a:t>
             </a:r>
             <a:r>
-              <a:rPr lang="en-US" dirty="0" err="1"/>
-              <a:t>donot</a:t>
+              <a:rPr lang="en-US" dirty="0" smtClean="0"/>
+              <a:t>do not </a:t>
             </a:r>
             <a:r>
               <a:rPr lang="en-US" dirty="0"/>
-              <a:t> have equal access times to the memories of </a:t>
-            </a:r>
-            <a:r>
-              <a:rPr lang="en-US" dirty="0" err="1"/>
-              <a:t>allother</a:t>
+              <a:t>have equal access times to the memories of </a:t>
+            </a:r>
+            <a:r>
+              <a:rPr lang="en-US" dirty="0" smtClean="0"/>
+              <a:t>all other </a:t>
             </a:r>
             <a:r>
               <a:rPr lang="en-US" dirty="0"/>
-              <a:t> SMPs. Moreover, the memory access across the link is slower.</a:t>
+              <a:t>SMPs. Moreover, the memory access across the link is slower.</a:t>
             </a:r>
           </a:p>
         </p:txBody>
       </p:sp>
+      <p:pic>
+        <p:nvPicPr>
+          <p:cNvPr id="13" name="Picture 12"/>
+          <p:cNvPicPr>
+            <a:picLocks noChangeAspect="1"/>
+          </p:cNvPicPr>
+          <p:nvPr/>
+        </p:nvPicPr>
+        <p:blipFill>
+          <a:blip r:embed="rId2"/>
+          <a:stretch>
+            <a:fillRect/>
+          </a:stretch>
+        </p:blipFill>
+        <p:spPr>
+          <a:xfrm>
+            <a:off x="7428665" y="4423486"/>
+            <a:ext cx="4514193" cy="2154687"/>
+          </a:xfrm>
+          <a:prstGeom prst="rect">
+            <a:avLst/>
+          </a:prstGeom>
+        </p:spPr>
+      </p:pic>
+      <p:pic>
+        <p:nvPicPr>
+          <p:cNvPr id="15" name="Picture 14"/>
+          <p:cNvPicPr>
+            <a:picLocks noChangeAspect="1"/>
+          </p:cNvPicPr>
+          <p:nvPr/>
+        </p:nvPicPr>
+        <p:blipFill>
+          <a:blip r:embed="rId3"/>
+          <a:stretch>
+            <a:fillRect/>
+          </a:stretch>
+        </p:blipFill>
+        <p:spPr>
+          <a:xfrm>
+            <a:off x="1103312" y="4423486"/>
+            <a:ext cx="4713149" cy="1716155"/>
+          </a:xfrm>
+          <a:prstGeom prst="rect">
+            <a:avLst/>
+          </a:prstGeom>
+        </p:spPr>
+      </p:pic>
     </p:spTree>
     <p:extLst>
       <p:ext uri="{BB962C8B-B14F-4D97-AF65-F5344CB8AC3E}">
@@ -29530,6 +29466,13 @@
   <p:clrMapOvr>
     <a:overrideClrMapping bg1="lt1" tx1="dk1" bg2="lt2" tx2="dk2" accent1="accent1" accent2="accent2" accent3="accent3" accent4="accent4" accent5="accent5" accent6="accent6" hlink="hlink" folHlink="folHlink"/>
   </p:clrMapOvr>
+  <p:timing>
+    <p:tnLst>
+      <p:par>
+        <p:cTn id="1" dur="indefinite" restart="never" nodeType="tmRoot"/>
+      </p:par>
+    </p:tnLst>
+  </p:timing>
 </p:sld>
 </file>
 
@@ -29563,10 +29506,10 @@
           <p:cNvPr id="8" name="Rectangle 7">
             <a:extLst>
               <a:ext uri="{FF2B5EF4-FFF2-40B4-BE49-F238E27FC236}">
-                <a16:creationId xmlns="" xmlns:a16="http://schemas.microsoft.com/office/drawing/2014/main" id="{74CD14DB-BB81-479F-A1FC-1C75640E9F84}"/>
+                <a16:creationId xmlns:a16="http://schemas.microsoft.com/office/drawing/2014/main" xmlns="" id="{74CD14DB-BB81-479F-A1FC-1C75640E9F84}"/>
               </a:ext>
               <a:ext uri="{C183D7F6-B498-43B3-948B-1728B52AA6E4}">
-                <adec:decorative xmlns="" xmlns:adec="http://schemas.microsoft.com/office/drawing/2017/decorative" val="1"/>
+                <adec:decorative xmlns:adec="http://schemas.microsoft.com/office/drawing/2017/decorative" xmlns="" val="1"/>
               </a:ext>
             </a:extLst>
           </p:cNvPr>
@@ -29652,10 +29595,10 @@
           <p:cNvPr id="10" name="Rectangle 9">
             <a:extLst>
               <a:ext uri="{FF2B5EF4-FFF2-40B4-BE49-F238E27FC236}">
-                <a16:creationId xmlns="" xmlns:a16="http://schemas.microsoft.com/office/drawing/2014/main" id="{C943A91B-7CA7-4592-A975-73B1BF8C4C74}"/>
+                <a16:creationId xmlns:a16="http://schemas.microsoft.com/office/drawing/2014/main" xmlns="" id="{C943A91B-7CA7-4592-A975-73B1BF8C4C74}"/>
               </a:ext>
               <a:ext uri="{C183D7F6-B498-43B3-948B-1728B52AA6E4}">
-                <adec:decorative xmlns="" xmlns:adec="http://schemas.microsoft.com/office/drawing/2017/decorative" val="1"/>
+                <adec:decorative xmlns:adec="http://schemas.microsoft.com/office/drawing/2017/decorative" xmlns="" val="1"/>
               </a:ext>
             </a:extLst>
           </p:cNvPr>
@@ -29705,10 +29648,10 @@
           <p:cNvPr id="12" name="Freeform 7">
             <a:extLst>
               <a:ext uri="{FF2B5EF4-FFF2-40B4-BE49-F238E27FC236}">
-                <a16:creationId xmlns="" xmlns:a16="http://schemas.microsoft.com/office/drawing/2014/main" id="{EC471314-E46A-414B-8D91-74880E84F187}"/>
+                <a16:creationId xmlns:a16="http://schemas.microsoft.com/office/drawing/2014/main" xmlns="" id="{EC471314-E46A-414B-8D91-74880E84F187}"/>
               </a:ext>
               <a:ext uri="{C183D7F6-B498-43B3-948B-1728B52AA6E4}">
-                <adec:decorative xmlns="" xmlns:adec="http://schemas.microsoft.com/office/drawing/2017/decorative" val="1"/>
+                <adec:decorative xmlns:adec="http://schemas.microsoft.com/office/drawing/2017/decorative" xmlns="" val="1"/>
               </a:ext>
             </a:extLst>
           </p:cNvPr>
@@ -30094,10 +30037,10 @@
           <p:cNvPr id="14" name="Freeform: Shape 13">
             <a:extLst>
               <a:ext uri="{FF2B5EF4-FFF2-40B4-BE49-F238E27FC236}">
-                <a16:creationId xmlns="" xmlns:a16="http://schemas.microsoft.com/office/drawing/2014/main" id="{6A681326-1C9D-44A3-A627-3871BDAE4127}"/>
+                <a16:creationId xmlns:a16="http://schemas.microsoft.com/office/drawing/2014/main" xmlns="" id="{6A681326-1C9D-44A3-A627-3871BDAE4127}"/>
               </a:ext>
               <a:ext uri="{C183D7F6-B498-43B3-948B-1728B52AA6E4}">
-                <adec:decorative xmlns="" xmlns:adec="http://schemas.microsoft.com/office/drawing/2017/decorative" val="1"/>
+                <adec:decorative xmlns:adec="http://schemas.microsoft.com/office/drawing/2017/decorative" xmlns="" val="1"/>
               </a:ext>
             </a:extLst>
           </p:cNvPr>
@@ -30557,7 +30500,7 @@
           <p:cNvPr id="2" name="Title 1">
             <a:extLst>
               <a:ext uri="{FF2B5EF4-FFF2-40B4-BE49-F238E27FC236}">
-                <a16:creationId xmlns="" xmlns:a16="http://schemas.microsoft.com/office/drawing/2014/main" id="{5343FD55-52BA-49ED-8622-99BA403F87BD}"/>
+                <a16:creationId xmlns:a16="http://schemas.microsoft.com/office/drawing/2014/main" xmlns="" id="{5343FD55-52BA-49ED-8622-99BA403F87BD}"/>
               </a:ext>
             </a:extLst>
           </p:cNvPr>
@@ -30596,7 +30539,7 @@
           <p:cNvPr id="3" name="Content Placeholder 2">
             <a:extLst>
               <a:ext uri="{FF2B5EF4-FFF2-40B4-BE49-F238E27FC236}">
-                <a16:creationId xmlns="" xmlns:a16="http://schemas.microsoft.com/office/drawing/2014/main" id="{03D921A0-DB4F-49E7-B69F-84CE55C2AD6E}"/>
+                <a16:creationId xmlns:a16="http://schemas.microsoft.com/office/drawing/2014/main" xmlns="" id="{03D921A0-DB4F-49E7-B69F-84CE55C2AD6E}"/>
               </a:ext>
             </a:extLst>
           </p:cNvPr>
@@ -30864,6 +30807,13 @@
   <p:clrMapOvr>
     <a:overrideClrMapping bg1="lt1" tx1="dk1" bg2="lt2" tx2="dk2" accent1="accent1" accent2="accent2" accent3="accent3" accent4="accent4" accent5="accent5" accent6="accent6" hlink="hlink" folHlink="folHlink"/>
   </p:clrMapOvr>
+  <p:timing>
+    <p:tnLst>
+      <p:par>
+        <p:cTn id="1" dur="indefinite" restart="never" nodeType="tmRoot"/>
+      </p:par>
+    </p:tnLst>
+  </p:timing>
 </p:sld>
 </file>
 
@@ -30897,10 +30847,10 @@
           <p:cNvPr id="8" name="Rectangle 7">
             <a:extLst>
               <a:ext uri="{FF2B5EF4-FFF2-40B4-BE49-F238E27FC236}">
-                <a16:creationId xmlns="" xmlns:a16="http://schemas.microsoft.com/office/drawing/2014/main" id="{74CD14DB-BB81-479F-A1FC-1C75640E9F84}"/>
+                <a16:creationId xmlns:a16="http://schemas.microsoft.com/office/drawing/2014/main" xmlns="" id="{74CD14DB-BB81-479F-A1FC-1C75640E9F84}"/>
               </a:ext>
               <a:ext uri="{C183D7F6-B498-43B3-948B-1728B52AA6E4}">
-                <adec:decorative xmlns="" xmlns:adec="http://schemas.microsoft.com/office/drawing/2017/decorative" val="1"/>
+                <adec:decorative xmlns:adec="http://schemas.microsoft.com/office/drawing/2017/decorative" xmlns="" val="1"/>
               </a:ext>
             </a:extLst>
           </p:cNvPr>
@@ -30986,10 +30936,10 @@
           <p:cNvPr id="10" name="Rectangle 9">
             <a:extLst>
               <a:ext uri="{FF2B5EF4-FFF2-40B4-BE49-F238E27FC236}">
-                <a16:creationId xmlns="" xmlns:a16="http://schemas.microsoft.com/office/drawing/2014/main" id="{C943A91B-7CA7-4592-A975-73B1BF8C4C74}"/>
+                <a16:creationId xmlns:a16="http://schemas.microsoft.com/office/drawing/2014/main" xmlns="" id="{C943A91B-7CA7-4592-A975-73B1BF8C4C74}"/>
               </a:ext>
               <a:ext uri="{C183D7F6-B498-43B3-948B-1728B52AA6E4}">
-                <adec:decorative xmlns="" xmlns:adec="http://schemas.microsoft.com/office/drawing/2017/decorative" val="1"/>
+                <adec:decorative xmlns:adec="http://schemas.microsoft.com/office/drawing/2017/decorative" xmlns="" val="1"/>
               </a:ext>
             </a:extLst>
           </p:cNvPr>
@@ -31039,10 +30989,10 @@
           <p:cNvPr id="12" name="Freeform 7">
             <a:extLst>
               <a:ext uri="{FF2B5EF4-FFF2-40B4-BE49-F238E27FC236}">
-                <a16:creationId xmlns="" xmlns:a16="http://schemas.microsoft.com/office/drawing/2014/main" id="{EC471314-E46A-414B-8D91-74880E84F187}"/>
+                <a16:creationId xmlns:a16="http://schemas.microsoft.com/office/drawing/2014/main" xmlns="" id="{EC471314-E46A-414B-8D91-74880E84F187}"/>
               </a:ext>
               <a:ext uri="{C183D7F6-B498-43B3-948B-1728B52AA6E4}">
-                <adec:decorative xmlns="" xmlns:adec="http://schemas.microsoft.com/office/drawing/2017/decorative" val="1"/>
+                <adec:decorative xmlns:adec="http://schemas.microsoft.com/office/drawing/2017/decorative" xmlns="" val="1"/>
               </a:ext>
             </a:extLst>
           </p:cNvPr>
@@ -31428,10 +31378,10 @@
           <p:cNvPr id="14" name="Freeform: Shape 13">
             <a:extLst>
               <a:ext uri="{FF2B5EF4-FFF2-40B4-BE49-F238E27FC236}">
-                <a16:creationId xmlns="" xmlns:a16="http://schemas.microsoft.com/office/drawing/2014/main" id="{6A681326-1C9D-44A3-A627-3871BDAE4127}"/>
+                <a16:creationId xmlns:a16="http://schemas.microsoft.com/office/drawing/2014/main" xmlns="" id="{6A681326-1C9D-44A3-A627-3871BDAE4127}"/>
               </a:ext>
               <a:ext uri="{C183D7F6-B498-43B3-948B-1728B52AA6E4}">
-                <adec:decorative xmlns="" xmlns:adec="http://schemas.microsoft.com/office/drawing/2017/decorative" val="1"/>
+                <adec:decorative xmlns:adec="http://schemas.microsoft.com/office/drawing/2017/decorative" xmlns="" val="1"/>
               </a:ext>
             </a:extLst>
           </p:cNvPr>
@@ -31891,7 +31841,7 @@
           <p:cNvPr id="2" name="Title 1">
             <a:extLst>
               <a:ext uri="{FF2B5EF4-FFF2-40B4-BE49-F238E27FC236}">
-                <a16:creationId xmlns="" xmlns:a16="http://schemas.microsoft.com/office/drawing/2014/main" id="{5343FD55-52BA-49ED-8622-99BA403F87BD}"/>
+                <a16:creationId xmlns:a16="http://schemas.microsoft.com/office/drawing/2014/main" xmlns="" id="{5343FD55-52BA-49ED-8622-99BA403F87BD}"/>
               </a:ext>
             </a:extLst>
           </p:cNvPr>
@@ -31930,7 +31880,7 @@
           <p:cNvPr id="3" name="Content Placeholder 2">
             <a:extLst>
               <a:ext uri="{FF2B5EF4-FFF2-40B4-BE49-F238E27FC236}">
-                <a16:creationId xmlns="" xmlns:a16="http://schemas.microsoft.com/office/drawing/2014/main" id="{03D921A0-DB4F-49E7-B69F-84CE55C2AD6E}"/>
+                <a16:creationId xmlns:a16="http://schemas.microsoft.com/office/drawing/2014/main" xmlns="" id="{03D921A0-DB4F-49E7-B69F-84CE55C2AD6E}"/>
               </a:ext>
             </a:extLst>
           </p:cNvPr>
@@ -32106,10 +32056,10 @@
           <p:cNvPr id="8" name="Rectangle 7">
             <a:extLst>
               <a:ext uri="{FF2B5EF4-FFF2-40B4-BE49-F238E27FC236}">
-                <a16:creationId xmlns="" xmlns:a16="http://schemas.microsoft.com/office/drawing/2014/main" id="{74CD14DB-BB81-479F-A1FC-1C75640E9F84}"/>
+                <a16:creationId xmlns:a16="http://schemas.microsoft.com/office/drawing/2014/main" xmlns="" id="{74CD14DB-BB81-479F-A1FC-1C75640E9F84}"/>
               </a:ext>
               <a:ext uri="{C183D7F6-B498-43B3-948B-1728B52AA6E4}">
-                <adec:decorative xmlns="" xmlns:adec="http://schemas.microsoft.com/office/drawing/2017/decorative" val="1"/>
+                <adec:decorative xmlns:adec="http://schemas.microsoft.com/office/drawing/2017/decorative" xmlns="" val="1"/>
               </a:ext>
             </a:extLst>
           </p:cNvPr>
@@ -32195,10 +32145,10 @@
           <p:cNvPr id="10" name="Rectangle 9">
             <a:extLst>
               <a:ext uri="{FF2B5EF4-FFF2-40B4-BE49-F238E27FC236}">
-                <a16:creationId xmlns="" xmlns:a16="http://schemas.microsoft.com/office/drawing/2014/main" id="{C943A91B-7CA7-4592-A975-73B1BF8C4C74}"/>
+                <a16:creationId xmlns:a16="http://schemas.microsoft.com/office/drawing/2014/main" xmlns="" id="{C943A91B-7CA7-4592-A975-73B1BF8C4C74}"/>
               </a:ext>
               <a:ext uri="{C183D7F6-B498-43B3-948B-1728B52AA6E4}">
-                <adec:decorative xmlns="" xmlns:adec="http://schemas.microsoft.com/office/drawing/2017/decorative" val="1"/>
+                <adec:decorative xmlns:adec="http://schemas.microsoft.com/office/drawing/2017/decorative" xmlns="" val="1"/>
               </a:ext>
             </a:extLst>
           </p:cNvPr>
@@ -32248,10 +32198,10 @@
           <p:cNvPr id="12" name="Freeform 7">
             <a:extLst>
               <a:ext uri="{FF2B5EF4-FFF2-40B4-BE49-F238E27FC236}">
-                <a16:creationId xmlns="" xmlns:a16="http://schemas.microsoft.com/office/drawing/2014/main" id="{EC471314-E46A-414B-8D91-74880E84F187}"/>
+                <a16:creationId xmlns:a16="http://schemas.microsoft.com/office/drawing/2014/main" xmlns="" id="{EC471314-E46A-414B-8D91-74880E84F187}"/>
               </a:ext>
               <a:ext uri="{C183D7F6-B498-43B3-948B-1728B52AA6E4}">
-                <adec:decorative xmlns="" xmlns:adec="http://schemas.microsoft.com/office/drawing/2017/decorative" val="1"/>
+                <adec:decorative xmlns:adec="http://schemas.microsoft.com/office/drawing/2017/decorative" xmlns="" val="1"/>
               </a:ext>
             </a:extLst>
           </p:cNvPr>
@@ -32637,10 +32587,10 @@
           <p:cNvPr id="14" name="Freeform: Shape 13">
             <a:extLst>
               <a:ext uri="{FF2B5EF4-FFF2-40B4-BE49-F238E27FC236}">
-                <a16:creationId xmlns="" xmlns:a16="http://schemas.microsoft.com/office/drawing/2014/main" id="{6A681326-1C9D-44A3-A627-3871BDAE4127}"/>
+                <a16:creationId xmlns:a16="http://schemas.microsoft.com/office/drawing/2014/main" xmlns="" id="{6A681326-1C9D-44A3-A627-3871BDAE4127}"/>
               </a:ext>
               <a:ext uri="{C183D7F6-B498-43B3-948B-1728B52AA6E4}">
-                <adec:decorative xmlns="" xmlns:adec="http://schemas.microsoft.com/office/drawing/2017/decorative" val="1"/>
+                <adec:decorative xmlns:adec="http://schemas.microsoft.com/office/drawing/2017/decorative" xmlns="" val="1"/>
               </a:ext>
             </a:extLst>
           </p:cNvPr>
@@ -33100,7 +33050,7 @@
           <p:cNvPr id="2" name="Title 1">
             <a:extLst>
               <a:ext uri="{FF2B5EF4-FFF2-40B4-BE49-F238E27FC236}">
-                <a16:creationId xmlns="" xmlns:a16="http://schemas.microsoft.com/office/drawing/2014/main" id="{5343FD55-52BA-49ED-8622-99BA403F87BD}"/>
+                <a16:creationId xmlns:a16="http://schemas.microsoft.com/office/drawing/2014/main" xmlns="" id="{5343FD55-52BA-49ED-8622-99BA403F87BD}"/>
               </a:ext>
             </a:extLst>
           </p:cNvPr>
@@ -33139,7 +33089,7 @@
           <p:cNvPr id="3" name="Content Placeholder 2">
             <a:extLst>
               <a:ext uri="{FF2B5EF4-FFF2-40B4-BE49-F238E27FC236}">
-                <a16:creationId xmlns="" xmlns:a16="http://schemas.microsoft.com/office/drawing/2014/main" id="{03D921A0-DB4F-49E7-B69F-84CE55C2AD6E}"/>
+                <a16:creationId xmlns:a16="http://schemas.microsoft.com/office/drawing/2014/main" xmlns="" id="{03D921A0-DB4F-49E7-B69F-84CE55C2AD6E}"/>
               </a:ext>
             </a:extLst>
           </p:cNvPr>

</xml_diff>